<commit_message>
add image in lab 1
</commit_message>
<xml_diff>
--- a/docs/2223/labs/images/un_lmm.pptx
+++ b/docs/2223/labs/images/un_lmm.pptx
@@ -6,6 +6,7 @@
   </p:sldMasterIdLst>
   <p:sldIdLst>
     <p:sldId id="256" r:id="rId2"/>
+    <p:sldId id="257" r:id="rId3"/>
   </p:sldIdLst>
   <p:sldSz cx="12192000" cy="6858000"/>
   <p:notesSz cx="6858000" cy="9144000"/>
@@ -261,7 +262,7 @@
           <a:p>
             <a:fld id="{1F0CBD5E-49E7-7C4F-9044-BAEC7178F380}" type="datetimeFigureOut">
               <a:rPr lang="en-US" smtClean="0"/>
-              <a:t>2/2/21</a:t>
+              <a:t>1/17/23</a:t>
             </a:fld>
             <a:endParaRPr lang="en-US"/>
           </a:p>
@@ -461,7 +462,7 @@
           <a:p>
             <a:fld id="{1F0CBD5E-49E7-7C4F-9044-BAEC7178F380}" type="datetimeFigureOut">
               <a:rPr lang="en-US" smtClean="0"/>
-              <a:t>2/2/21</a:t>
+              <a:t>1/17/23</a:t>
             </a:fld>
             <a:endParaRPr lang="en-US"/>
           </a:p>
@@ -671,7 +672,7 @@
           <a:p>
             <a:fld id="{1F0CBD5E-49E7-7C4F-9044-BAEC7178F380}" type="datetimeFigureOut">
               <a:rPr lang="en-US" smtClean="0"/>
-              <a:t>2/2/21</a:t>
+              <a:t>1/17/23</a:t>
             </a:fld>
             <a:endParaRPr lang="en-US"/>
           </a:p>
@@ -871,7 +872,7 @@
           <a:p>
             <a:fld id="{1F0CBD5E-49E7-7C4F-9044-BAEC7178F380}" type="datetimeFigureOut">
               <a:rPr lang="en-US" smtClean="0"/>
-              <a:t>2/2/21</a:t>
+              <a:t>1/17/23</a:t>
             </a:fld>
             <a:endParaRPr lang="en-US"/>
           </a:p>
@@ -1147,7 +1148,7 @@
           <a:p>
             <a:fld id="{1F0CBD5E-49E7-7C4F-9044-BAEC7178F380}" type="datetimeFigureOut">
               <a:rPr lang="en-US" smtClean="0"/>
-              <a:t>2/2/21</a:t>
+              <a:t>1/17/23</a:t>
             </a:fld>
             <a:endParaRPr lang="en-US"/>
           </a:p>
@@ -1415,7 +1416,7 @@
           <a:p>
             <a:fld id="{1F0CBD5E-49E7-7C4F-9044-BAEC7178F380}" type="datetimeFigureOut">
               <a:rPr lang="en-US" smtClean="0"/>
-              <a:t>2/2/21</a:t>
+              <a:t>1/17/23</a:t>
             </a:fld>
             <a:endParaRPr lang="en-US"/>
           </a:p>
@@ -1830,7 +1831,7 @@
           <a:p>
             <a:fld id="{1F0CBD5E-49E7-7C4F-9044-BAEC7178F380}" type="datetimeFigureOut">
               <a:rPr lang="en-US" smtClean="0"/>
-              <a:t>2/2/21</a:t>
+              <a:t>1/17/23</a:t>
             </a:fld>
             <a:endParaRPr lang="en-US"/>
           </a:p>
@@ -1972,7 +1973,7 @@
           <a:p>
             <a:fld id="{1F0CBD5E-49E7-7C4F-9044-BAEC7178F380}" type="datetimeFigureOut">
               <a:rPr lang="en-US" smtClean="0"/>
-              <a:t>2/2/21</a:t>
+              <a:t>1/17/23</a:t>
             </a:fld>
             <a:endParaRPr lang="en-US"/>
           </a:p>
@@ -2085,7 +2086,7 @@
           <a:p>
             <a:fld id="{1F0CBD5E-49E7-7C4F-9044-BAEC7178F380}" type="datetimeFigureOut">
               <a:rPr lang="en-US" smtClean="0"/>
-              <a:t>2/2/21</a:t>
+              <a:t>1/17/23</a:t>
             </a:fld>
             <a:endParaRPr lang="en-US"/>
           </a:p>
@@ -2398,7 +2399,7 @@
           <a:p>
             <a:fld id="{1F0CBD5E-49E7-7C4F-9044-BAEC7178F380}" type="datetimeFigureOut">
               <a:rPr lang="en-US" smtClean="0"/>
-              <a:t>2/2/21</a:t>
+              <a:t>1/17/23</a:t>
             </a:fld>
             <a:endParaRPr lang="en-US"/>
           </a:p>
@@ -2687,7 +2688,7 @@
           <a:p>
             <a:fld id="{1F0CBD5E-49E7-7C4F-9044-BAEC7178F380}" type="datetimeFigureOut">
               <a:rPr lang="en-US" smtClean="0"/>
-              <a:t>2/2/21</a:t>
+              <a:t>1/17/23</a:t>
             </a:fld>
             <a:endParaRPr lang="en-US"/>
           </a:p>
@@ -2930,7 +2931,7 @@
           <a:p>
             <a:fld id="{1F0CBD5E-49E7-7C4F-9044-BAEC7178F380}" type="datetimeFigureOut">
               <a:rPr lang="en-US" smtClean="0"/>
-              <a:t>2/2/21</a:t>
+              <a:t>1/17/23</a:t>
             </a:fld>
             <a:endParaRPr lang="en-US"/>
           </a:p>
@@ -3786,8 +3787,8 @@
           </a:p>
         </p:txBody>
       </p:sp>
-      <mc:AlternateContent xmlns:mc="http://schemas.openxmlformats.org/markup-compatibility/2006">
-        <mc:Choice xmlns:a14="http://schemas.microsoft.com/office/drawing/2010/main" Requires="a14">
+      <mc:AlternateContent xmlns:mc="http://schemas.openxmlformats.org/markup-compatibility/2006" xmlns:a14="http://schemas.microsoft.com/office/drawing/2010/main">
+        <mc:Choice Requires="a14">
           <p:sp>
             <p:nvSpPr>
               <p:cNvPr id="24" name="TextBox 23">
@@ -3869,7 +3870,7 @@
             </p:txBody>
           </p:sp>
         </mc:Choice>
-        <mc:Fallback>
+        <mc:Fallback xmlns="">
           <p:sp>
             <p:nvSpPr>
               <p:cNvPr id="24" name="TextBox 23">
@@ -4243,8 +4244,8 @@
           </p:sp>
         </mc:Fallback>
       </mc:AlternateContent>
-      <mc:AlternateContent xmlns:mc="http://schemas.openxmlformats.org/markup-compatibility/2006">
-        <mc:Choice xmlns:a14="http://schemas.microsoft.com/office/drawing/2010/main" Requires="a14">
+      <mc:AlternateContent xmlns:mc="http://schemas.openxmlformats.org/markup-compatibility/2006" xmlns:a14="http://schemas.microsoft.com/office/drawing/2010/main">
+        <mc:Choice Requires="a14">
           <p:sp>
             <p:nvSpPr>
               <p:cNvPr id="32" name="TextBox 31">
@@ -4428,7 +4429,7 @@
             </p:txBody>
           </p:sp>
         </mc:Choice>
-        <mc:Fallback>
+        <mc:Fallback xmlns="">
           <p:sp>
             <p:nvSpPr>
               <p:cNvPr id="32" name="TextBox 31">
@@ -6066,6 +6067,3430 @@
 </p:sld>
 </file>
 
+<file path=ppt/slides/slide2.xml><?xml version="1.0" encoding="utf-8"?>
+<p:sld xmlns:a="http://schemas.openxmlformats.org/drawingml/2006/main" xmlns:r="http://schemas.openxmlformats.org/officeDocument/2006/relationships" xmlns:p="http://schemas.openxmlformats.org/presentationml/2006/main">
+  <p:cSld>
+    <p:spTree>
+      <p:nvGrpSpPr>
+        <p:cNvPr id="1" name=""/>
+        <p:cNvGrpSpPr/>
+        <p:nvPr/>
+      </p:nvGrpSpPr>
+      <p:grpSpPr>
+        <a:xfrm>
+          <a:off x="0" y="0"/>
+          <a:ext cx="0" cy="0"/>
+          <a:chOff x="0" y="0"/>
+          <a:chExt cx="0" cy="0"/>
+        </a:xfrm>
+      </p:grpSpPr>
+      <p:cxnSp>
+        <p:nvCxnSpPr>
+          <p:cNvPr id="2" name="Straight Arrow Connector 1">
+            <a:extLst>
+              <a:ext uri="{FF2B5EF4-FFF2-40B4-BE49-F238E27FC236}">
+                <a16:creationId xmlns:a16="http://schemas.microsoft.com/office/drawing/2014/main" id="{9CD5CCCF-06A0-86E6-65FA-80A125AAA6B9}"/>
+              </a:ext>
+            </a:extLst>
+          </p:cNvPr>
+          <p:cNvCxnSpPr/>
+          <p:nvPr/>
+        </p:nvCxnSpPr>
+        <p:spPr>
+          <a:xfrm>
+            <a:off x="2853701" y="5590083"/>
+            <a:ext cx="6944497" cy="0"/>
+          </a:xfrm>
+          <a:prstGeom prst="straightConnector1">
+            <a:avLst/>
+          </a:prstGeom>
+          <a:ln w="12700">
+            <a:tailEnd type="triangle"/>
+          </a:ln>
+        </p:spPr>
+        <p:style>
+          <a:lnRef idx="1">
+            <a:schemeClr val="dk1"/>
+          </a:lnRef>
+          <a:fillRef idx="0">
+            <a:schemeClr val="dk1"/>
+          </a:fillRef>
+          <a:effectRef idx="0">
+            <a:schemeClr val="dk1"/>
+          </a:effectRef>
+          <a:fontRef idx="minor">
+            <a:schemeClr val="tx1"/>
+          </a:fontRef>
+        </p:style>
+      </p:cxnSp>
+      <p:cxnSp>
+        <p:nvCxnSpPr>
+          <p:cNvPr id="3" name="Straight Arrow Connector 2">
+            <a:extLst>
+              <a:ext uri="{FF2B5EF4-FFF2-40B4-BE49-F238E27FC236}">
+                <a16:creationId xmlns:a16="http://schemas.microsoft.com/office/drawing/2014/main" id="{318A4536-75BC-3073-26E3-F291F4FD5DEC}"/>
+              </a:ext>
+            </a:extLst>
+          </p:cNvPr>
+          <p:cNvCxnSpPr>
+            <a:cxnSpLocks/>
+          </p:cNvCxnSpPr>
+          <p:nvPr/>
+        </p:nvCxnSpPr>
+        <p:spPr>
+          <a:xfrm flipV="1">
+            <a:off x="2853701" y="609600"/>
+            <a:ext cx="0" cy="4980483"/>
+          </a:xfrm>
+          <a:prstGeom prst="straightConnector1">
+            <a:avLst/>
+          </a:prstGeom>
+          <a:ln w="12700">
+            <a:tailEnd type="triangle"/>
+          </a:ln>
+        </p:spPr>
+        <p:style>
+          <a:lnRef idx="1">
+            <a:schemeClr val="dk1"/>
+          </a:lnRef>
+          <a:fillRef idx="0">
+            <a:schemeClr val="dk1"/>
+          </a:fillRef>
+          <a:effectRef idx="0">
+            <a:schemeClr val="dk1"/>
+          </a:effectRef>
+          <a:fontRef idx="minor">
+            <a:schemeClr val="tx1"/>
+          </a:fontRef>
+        </p:style>
+      </p:cxnSp>
+      <p:sp>
+        <p:nvSpPr>
+          <p:cNvPr id="4" name="Oval 3">
+            <a:extLst>
+              <a:ext uri="{FF2B5EF4-FFF2-40B4-BE49-F238E27FC236}">
+                <a16:creationId xmlns:a16="http://schemas.microsoft.com/office/drawing/2014/main" id="{7A886D36-4833-5638-1178-7D49EE4F1A12}"/>
+              </a:ext>
+            </a:extLst>
+          </p:cNvPr>
+          <p:cNvSpPr/>
+          <p:nvPr/>
+        </p:nvSpPr>
+        <p:spPr>
+          <a:xfrm>
+            <a:off x="3897568" y="3450021"/>
+            <a:ext cx="105104" cy="105104"/>
+          </a:xfrm>
+          <a:prstGeom prst="ellipse">
+            <a:avLst/>
+          </a:prstGeom>
+          <a:solidFill>
+            <a:schemeClr val="accent6">
+              <a:lumMod val="75000"/>
+            </a:schemeClr>
+          </a:solidFill>
+          <a:ln>
+            <a:solidFill>
+              <a:schemeClr val="accent6">
+                <a:lumMod val="75000"/>
+              </a:schemeClr>
+            </a:solidFill>
+          </a:ln>
+        </p:spPr>
+        <p:style>
+          <a:lnRef idx="2">
+            <a:schemeClr val="dk1">
+              <a:shade val="50000"/>
+            </a:schemeClr>
+          </a:lnRef>
+          <a:fillRef idx="1">
+            <a:schemeClr val="dk1"/>
+          </a:fillRef>
+          <a:effectRef idx="0">
+            <a:schemeClr val="dk1"/>
+          </a:effectRef>
+          <a:fontRef idx="minor">
+            <a:schemeClr val="lt1"/>
+          </a:fontRef>
+        </p:style>
+        <p:txBody>
+          <a:bodyPr rtlCol="0" anchor="ctr"/>
+          <a:lstStyle/>
+          <a:p>
+            <a:pPr algn="ctr"/>
+            <a:endParaRPr lang="en-US"/>
+          </a:p>
+        </p:txBody>
+      </p:sp>
+      <p:sp>
+        <p:nvSpPr>
+          <p:cNvPr id="5" name="Oval 4">
+            <a:extLst>
+              <a:ext uri="{FF2B5EF4-FFF2-40B4-BE49-F238E27FC236}">
+                <a16:creationId xmlns:a16="http://schemas.microsoft.com/office/drawing/2014/main" id="{26267133-5C6E-2C85-4DE5-C282BB7FC286}"/>
+              </a:ext>
+            </a:extLst>
+          </p:cNvPr>
+          <p:cNvSpPr/>
+          <p:nvPr/>
+        </p:nvSpPr>
+        <p:spPr>
+          <a:xfrm>
+            <a:off x="6975067" y="2148989"/>
+            <a:ext cx="105104" cy="105104"/>
+          </a:xfrm>
+          <a:prstGeom prst="ellipse">
+            <a:avLst/>
+          </a:prstGeom>
+          <a:solidFill>
+            <a:schemeClr val="accent6">
+              <a:lumMod val="75000"/>
+            </a:schemeClr>
+          </a:solidFill>
+          <a:ln>
+            <a:solidFill>
+              <a:schemeClr val="accent6">
+                <a:lumMod val="75000"/>
+              </a:schemeClr>
+            </a:solidFill>
+          </a:ln>
+        </p:spPr>
+        <p:style>
+          <a:lnRef idx="2">
+            <a:schemeClr val="dk1">
+              <a:shade val="50000"/>
+            </a:schemeClr>
+          </a:lnRef>
+          <a:fillRef idx="1">
+            <a:schemeClr val="dk1"/>
+          </a:fillRef>
+          <a:effectRef idx="0">
+            <a:schemeClr val="dk1"/>
+          </a:effectRef>
+          <a:fontRef idx="minor">
+            <a:schemeClr val="lt1"/>
+          </a:fontRef>
+        </p:style>
+        <p:txBody>
+          <a:bodyPr rtlCol="0" anchor="ctr"/>
+          <a:lstStyle/>
+          <a:p>
+            <a:pPr algn="ctr"/>
+            <a:endParaRPr lang="en-US"/>
+          </a:p>
+        </p:txBody>
+      </p:sp>
+      <p:sp>
+        <p:nvSpPr>
+          <p:cNvPr id="6" name="Oval 5">
+            <a:extLst>
+              <a:ext uri="{FF2B5EF4-FFF2-40B4-BE49-F238E27FC236}">
+                <a16:creationId xmlns:a16="http://schemas.microsoft.com/office/drawing/2014/main" id="{81E67903-74BF-0A3A-AF3F-FC543A5EE75E}"/>
+              </a:ext>
+            </a:extLst>
+          </p:cNvPr>
+          <p:cNvSpPr/>
+          <p:nvPr/>
+        </p:nvSpPr>
+        <p:spPr>
+          <a:xfrm>
+            <a:off x="8636811" y="1162812"/>
+            <a:ext cx="105104" cy="105104"/>
+          </a:xfrm>
+          <a:prstGeom prst="ellipse">
+            <a:avLst/>
+          </a:prstGeom>
+          <a:solidFill>
+            <a:schemeClr val="accent6">
+              <a:lumMod val="75000"/>
+            </a:schemeClr>
+          </a:solidFill>
+          <a:ln>
+            <a:solidFill>
+              <a:schemeClr val="accent6">
+                <a:lumMod val="75000"/>
+              </a:schemeClr>
+            </a:solidFill>
+          </a:ln>
+        </p:spPr>
+        <p:style>
+          <a:lnRef idx="2">
+            <a:schemeClr val="dk1">
+              <a:shade val="50000"/>
+            </a:schemeClr>
+          </a:lnRef>
+          <a:fillRef idx="1">
+            <a:schemeClr val="dk1"/>
+          </a:fillRef>
+          <a:effectRef idx="0">
+            <a:schemeClr val="dk1"/>
+          </a:effectRef>
+          <a:fontRef idx="minor">
+            <a:schemeClr val="lt1"/>
+          </a:fontRef>
+        </p:style>
+        <p:txBody>
+          <a:bodyPr rtlCol="0" anchor="ctr"/>
+          <a:lstStyle/>
+          <a:p>
+            <a:pPr algn="ctr"/>
+            <a:endParaRPr lang="en-US"/>
+          </a:p>
+        </p:txBody>
+      </p:sp>
+      <p:cxnSp>
+        <p:nvCxnSpPr>
+          <p:cNvPr id="7" name="Straight Connector 6">
+            <a:extLst>
+              <a:ext uri="{FF2B5EF4-FFF2-40B4-BE49-F238E27FC236}">
+                <a16:creationId xmlns:a16="http://schemas.microsoft.com/office/drawing/2014/main" id="{543A6DF0-2369-600B-C844-7F3257F7B57D}"/>
+              </a:ext>
+            </a:extLst>
+          </p:cNvPr>
+          <p:cNvCxnSpPr>
+            <a:cxnSpLocks/>
+          </p:cNvCxnSpPr>
+          <p:nvPr/>
+        </p:nvCxnSpPr>
+        <p:spPr>
+          <a:xfrm flipV="1">
+            <a:off x="2492372" y="1267916"/>
+            <a:ext cx="6497799" cy="2610402"/>
+          </a:xfrm>
+          <a:prstGeom prst="line">
+            <a:avLst/>
+          </a:prstGeom>
+          <a:ln w="28575">
+            <a:solidFill>
+              <a:schemeClr val="accent6">
+                <a:lumMod val="75000"/>
+              </a:schemeClr>
+            </a:solidFill>
+          </a:ln>
+        </p:spPr>
+        <p:style>
+          <a:lnRef idx="1">
+            <a:schemeClr val="accent1"/>
+          </a:lnRef>
+          <a:fillRef idx="0">
+            <a:schemeClr val="accent1"/>
+          </a:fillRef>
+          <a:effectRef idx="0">
+            <a:schemeClr val="accent1"/>
+          </a:effectRef>
+          <a:fontRef idx="minor">
+            <a:schemeClr val="tx1"/>
+          </a:fontRef>
+        </p:style>
+      </p:cxnSp>
+      <p:cxnSp>
+        <p:nvCxnSpPr>
+          <p:cNvPr id="8" name="Straight Connector 7">
+            <a:extLst>
+              <a:ext uri="{FF2B5EF4-FFF2-40B4-BE49-F238E27FC236}">
+                <a16:creationId xmlns:a16="http://schemas.microsoft.com/office/drawing/2014/main" id="{5E62B8C7-59F0-DBF2-EB27-AEFC3D66F58A}"/>
+              </a:ext>
+            </a:extLst>
+          </p:cNvPr>
+          <p:cNvCxnSpPr>
+            <a:cxnSpLocks/>
+          </p:cNvCxnSpPr>
+          <p:nvPr/>
+        </p:nvCxnSpPr>
+        <p:spPr>
+          <a:xfrm flipV="1">
+            <a:off x="2108744" y="3164164"/>
+            <a:ext cx="8391090" cy="1770444"/>
+          </a:xfrm>
+          <a:prstGeom prst="line">
+            <a:avLst/>
+          </a:prstGeom>
+          <a:ln w="28575">
+            <a:solidFill>
+              <a:schemeClr val="accent1"/>
+            </a:solidFill>
+          </a:ln>
+        </p:spPr>
+        <p:style>
+          <a:lnRef idx="1">
+            <a:schemeClr val="accent1"/>
+          </a:lnRef>
+          <a:fillRef idx="0">
+            <a:schemeClr val="accent1"/>
+          </a:fillRef>
+          <a:effectRef idx="0">
+            <a:schemeClr val="accent1"/>
+          </a:effectRef>
+          <a:fontRef idx="minor">
+            <a:schemeClr val="tx1"/>
+          </a:fontRef>
+        </p:style>
+      </p:cxnSp>
+      <p:sp>
+        <p:nvSpPr>
+          <p:cNvPr id="9" name="TextBox 8">
+            <a:extLst>
+              <a:ext uri="{FF2B5EF4-FFF2-40B4-BE49-F238E27FC236}">
+                <a16:creationId xmlns:a16="http://schemas.microsoft.com/office/drawing/2014/main" id="{64F50973-E36E-1BFB-5EE1-26A3AF86977B}"/>
+              </a:ext>
+            </a:extLst>
+          </p:cNvPr>
+          <p:cNvSpPr txBox="1"/>
+          <p:nvPr/>
+        </p:nvSpPr>
+        <p:spPr>
+          <a:xfrm>
+            <a:off x="10567059" y="2915175"/>
+            <a:ext cx="1242071" cy="369332"/>
+          </a:xfrm>
+          <a:prstGeom prst="rect">
+            <a:avLst/>
+          </a:prstGeom>
+          <a:noFill/>
+        </p:spPr>
+        <p:txBody>
+          <a:bodyPr wrap="none" rtlCol="0">
+            <a:spAutoFit/>
+          </a:bodyPr>
+          <a:lstStyle/>
+          <a:p>
+            <a:r>
+              <a:rPr lang="en-US" dirty="0">
+                <a:solidFill>
+                  <a:schemeClr val="accent1"/>
+                </a:solidFill>
+              </a:rPr>
+              <a:t>overall line</a:t>
+            </a:r>
+          </a:p>
+        </p:txBody>
+      </p:sp>
+      <mc:AlternateContent xmlns:mc="http://schemas.openxmlformats.org/markup-compatibility/2006" xmlns:a14="http://schemas.microsoft.com/office/drawing/2010/main">
+        <mc:Choice Requires="a14">
+          <p:sp>
+            <p:nvSpPr>
+              <p:cNvPr id="10" name="TextBox 9">
+                <a:extLst>
+                  <a:ext uri="{FF2B5EF4-FFF2-40B4-BE49-F238E27FC236}">
+                    <a16:creationId xmlns:a16="http://schemas.microsoft.com/office/drawing/2014/main" id="{090D1857-3938-97E3-7CA6-F02BE173247A}"/>
+                  </a:ext>
+                </a:extLst>
+              </p:cNvPr>
+              <p:cNvSpPr txBox="1"/>
+              <p:nvPr/>
+            </p:nvSpPr>
+            <p:spPr>
+              <a:xfrm>
+                <a:off x="2853701" y="4749942"/>
+                <a:ext cx="556819" cy="369332"/>
+              </a:xfrm>
+              <a:prstGeom prst="rect">
+                <a:avLst/>
+              </a:prstGeom>
+              <a:noFill/>
+            </p:spPr>
+            <p:txBody>
+              <a:bodyPr wrap="none" rtlCol="0">
+                <a:spAutoFit/>
+              </a:bodyPr>
+              <a:lstStyle/>
+              <a:p>
+                <a:pPr/>
+                <a14:m>
+                  <m:oMathPara xmlns:m="http://schemas.openxmlformats.org/officeDocument/2006/math">
+                    <m:oMathParaPr>
+                      <m:jc m:val="centerGroup"/>
+                    </m:oMathParaPr>
+                    <m:oMath xmlns:m="http://schemas.openxmlformats.org/officeDocument/2006/math">
+                      <m:sSub>
+                        <m:sSubPr>
+                          <m:ctrlPr>
+                            <a:rPr lang="en-US" b="0" i="1" smtClean="0">
+                              <a:solidFill>
+                                <a:schemeClr val="accent1"/>
+                              </a:solidFill>
+                              <a:latin typeface="Cambria Math" panose="02040503050406030204" pitchFamily="18" charset="0"/>
+                            </a:rPr>
+                          </m:ctrlPr>
+                        </m:sSubPr>
+                        <m:e>
+                          <m:r>
+                            <a:rPr lang="en-US" b="0" i="1" smtClean="0">
+                              <a:solidFill>
+                                <a:schemeClr val="accent1"/>
+                              </a:solidFill>
+                              <a:latin typeface="Cambria Math" panose="02040503050406030204" pitchFamily="18" charset="0"/>
+                            </a:rPr>
+                            <m:t>𝛾</m:t>
+                          </m:r>
+                        </m:e>
+                        <m:sub>
+                          <m:r>
+                            <a:rPr lang="en-US" b="0" i="1" smtClean="0">
+                              <a:solidFill>
+                                <a:schemeClr val="accent1"/>
+                              </a:solidFill>
+                              <a:latin typeface="Cambria Math" panose="02040503050406030204" pitchFamily="18" charset="0"/>
+                            </a:rPr>
+                            <m:t>00</m:t>
+                          </m:r>
+                        </m:sub>
+                      </m:sSub>
+                    </m:oMath>
+                  </m:oMathPara>
+                </a14:m>
+                <a:endParaRPr lang="en-US" dirty="0">
+                  <a:solidFill>
+                    <a:schemeClr val="accent1"/>
+                  </a:solidFill>
+                </a:endParaRPr>
+              </a:p>
+            </p:txBody>
+          </p:sp>
+        </mc:Choice>
+        <mc:Fallback xmlns="">
+          <p:sp>
+            <p:nvSpPr>
+              <p:cNvPr id="10" name="TextBox 9">
+                <a:extLst>
+                  <a:ext uri="{FF2B5EF4-FFF2-40B4-BE49-F238E27FC236}">
+                    <a16:creationId xmlns:a16="http://schemas.microsoft.com/office/drawing/2014/main" id="{090D1857-3938-97E3-7CA6-F02BE173247A}"/>
+                  </a:ext>
+                </a:extLst>
+              </p:cNvPr>
+              <p:cNvSpPr txBox="1">
+                <a:spLocks noRot="1" noChangeAspect="1" noMove="1" noResize="1" noEditPoints="1" noAdjustHandles="1" noChangeArrowheads="1" noChangeShapeType="1" noTextEdit="1"/>
+              </p:cNvSpPr>
+              <p:nvPr/>
+            </p:nvSpPr>
+            <p:spPr>
+              <a:xfrm>
+                <a:off x="2853701" y="4749942"/>
+                <a:ext cx="556819" cy="369332"/>
+              </a:xfrm>
+              <a:prstGeom prst="rect">
+                <a:avLst/>
+              </a:prstGeom>
+              <a:blipFill>
+                <a:blip r:embed="rId2"/>
+                <a:stretch>
+                  <a:fillRect b="-6452"/>
+                </a:stretch>
+              </a:blipFill>
+            </p:spPr>
+            <p:txBody>
+              <a:bodyPr/>
+              <a:lstStyle/>
+              <a:p>
+                <a:r>
+                  <a:rPr lang="en-US">
+                    <a:noFill/>
+                  </a:rPr>
+                  <a:t> </a:t>
+                </a:r>
+              </a:p>
+            </p:txBody>
+          </p:sp>
+        </mc:Fallback>
+      </mc:AlternateContent>
+      <mc:AlternateContent xmlns:mc="http://schemas.openxmlformats.org/markup-compatibility/2006" xmlns:a14="http://schemas.microsoft.com/office/drawing/2010/main">
+        <mc:Choice Requires="a14">
+          <p:sp>
+            <p:nvSpPr>
+              <p:cNvPr id="11" name="TextBox 10">
+                <a:extLst>
+                  <a:ext uri="{FF2B5EF4-FFF2-40B4-BE49-F238E27FC236}">
+                    <a16:creationId xmlns:a16="http://schemas.microsoft.com/office/drawing/2014/main" id="{4D2B9141-142E-9644-682C-C214F576553F}"/>
+                  </a:ext>
+                </a:extLst>
+              </p:cNvPr>
+              <p:cNvSpPr txBox="1"/>
+              <p:nvPr/>
+            </p:nvSpPr>
+            <p:spPr>
+              <a:xfrm>
+                <a:off x="7614090" y="3719375"/>
+                <a:ext cx="551498" cy="369332"/>
+              </a:xfrm>
+              <a:prstGeom prst="rect">
+                <a:avLst/>
+              </a:prstGeom>
+              <a:noFill/>
+              <a:ln>
+                <a:noFill/>
+              </a:ln>
+            </p:spPr>
+            <p:txBody>
+              <a:bodyPr wrap="none" rtlCol="0">
+                <a:spAutoFit/>
+              </a:bodyPr>
+              <a:lstStyle/>
+              <a:p>
+                <a:pPr/>
+                <a14:m>
+                  <m:oMathPara xmlns:m="http://schemas.openxmlformats.org/officeDocument/2006/math">
+                    <m:oMathParaPr>
+                      <m:jc m:val="centerGroup"/>
+                    </m:oMathParaPr>
+                    <m:oMath xmlns:m="http://schemas.openxmlformats.org/officeDocument/2006/math">
+                      <m:sSub>
+                        <m:sSubPr>
+                          <m:ctrlPr>
+                            <a:rPr lang="en-US" b="0" i="1" smtClean="0">
+                              <a:solidFill>
+                                <a:schemeClr val="accent1"/>
+                              </a:solidFill>
+                              <a:latin typeface="Cambria Math" panose="02040503050406030204" pitchFamily="18" charset="0"/>
+                            </a:rPr>
+                          </m:ctrlPr>
+                        </m:sSubPr>
+                        <m:e>
+                          <m:r>
+                            <a:rPr lang="en-US" b="0" i="1" smtClean="0">
+                              <a:solidFill>
+                                <a:schemeClr val="accent1"/>
+                              </a:solidFill>
+                              <a:latin typeface="Cambria Math" panose="02040503050406030204" pitchFamily="18" charset="0"/>
+                            </a:rPr>
+                            <m:t>𝛾</m:t>
+                          </m:r>
+                        </m:e>
+                        <m:sub>
+                          <m:r>
+                            <a:rPr lang="en-US" b="0" i="1" smtClean="0">
+                              <a:solidFill>
+                                <a:schemeClr val="accent1"/>
+                              </a:solidFill>
+                              <a:latin typeface="Cambria Math" panose="02040503050406030204" pitchFamily="18" charset="0"/>
+                            </a:rPr>
+                            <m:t>10</m:t>
+                          </m:r>
+                        </m:sub>
+                      </m:sSub>
+                    </m:oMath>
+                  </m:oMathPara>
+                </a14:m>
+                <a:endParaRPr lang="en-US" dirty="0">
+                  <a:solidFill>
+                    <a:schemeClr val="accent1"/>
+                  </a:solidFill>
+                </a:endParaRPr>
+              </a:p>
+            </p:txBody>
+          </p:sp>
+        </mc:Choice>
+        <mc:Fallback xmlns="">
+          <p:sp>
+            <p:nvSpPr>
+              <p:cNvPr id="11" name="TextBox 10">
+                <a:extLst>
+                  <a:ext uri="{FF2B5EF4-FFF2-40B4-BE49-F238E27FC236}">
+                    <a16:creationId xmlns:a16="http://schemas.microsoft.com/office/drawing/2014/main" id="{4D2B9141-142E-9644-682C-C214F576553F}"/>
+                  </a:ext>
+                </a:extLst>
+              </p:cNvPr>
+              <p:cNvSpPr txBox="1">
+                <a:spLocks noRot="1" noChangeAspect="1" noMove="1" noResize="1" noEditPoints="1" noAdjustHandles="1" noChangeArrowheads="1" noChangeShapeType="1" noTextEdit="1"/>
+              </p:cNvSpPr>
+              <p:nvPr/>
+            </p:nvSpPr>
+            <p:spPr>
+              <a:xfrm>
+                <a:off x="7614090" y="3719375"/>
+                <a:ext cx="551498" cy="369332"/>
+              </a:xfrm>
+              <a:prstGeom prst="rect">
+                <a:avLst/>
+              </a:prstGeom>
+              <a:blipFill>
+                <a:blip r:embed="rId3"/>
+                <a:stretch>
+                  <a:fillRect b="-3226"/>
+                </a:stretch>
+              </a:blipFill>
+              <a:ln>
+                <a:noFill/>
+              </a:ln>
+            </p:spPr>
+            <p:txBody>
+              <a:bodyPr/>
+              <a:lstStyle/>
+              <a:p>
+                <a:r>
+                  <a:rPr lang="en-US">
+                    <a:noFill/>
+                  </a:rPr>
+                  <a:t> </a:t>
+                </a:r>
+              </a:p>
+            </p:txBody>
+          </p:sp>
+        </mc:Fallback>
+      </mc:AlternateContent>
+      <p:cxnSp>
+        <p:nvCxnSpPr>
+          <p:cNvPr id="12" name="Straight Connector 11">
+            <a:extLst>
+              <a:ext uri="{FF2B5EF4-FFF2-40B4-BE49-F238E27FC236}">
+                <a16:creationId xmlns:a16="http://schemas.microsoft.com/office/drawing/2014/main" id="{CF541FF2-4DFB-A29E-972B-56FCA7E18C30}"/>
+              </a:ext>
+            </a:extLst>
+          </p:cNvPr>
+          <p:cNvCxnSpPr/>
+          <p:nvPr/>
+        </p:nvCxnSpPr>
+        <p:spPr>
+          <a:xfrm>
+            <a:off x="6304289" y="4071417"/>
+            <a:ext cx="1236883" cy="0"/>
+          </a:xfrm>
+          <a:prstGeom prst="line">
+            <a:avLst/>
+          </a:prstGeom>
+          <a:ln w="38100">
+            <a:solidFill>
+              <a:schemeClr val="accent1"/>
+            </a:solidFill>
+            <a:prstDash val="solid"/>
+          </a:ln>
+        </p:spPr>
+        <p:style>
+          <a:lnRef idx="1">
+            <a:schemeClr val="accent1"/>
+          </a:lnRef>
+          <a:fillRef idx="0">
+            <a:schemeClr val="accent1"/>
+          </a:fillRef>
+          <a:effectRef idx="0">
+            <a:schemeClr val="accent1"/>
+          </a:effectRef>
+          <a:fontRef idx="minor">
+            <a:schemeClr val="tx1"/>
+          </a:fontRef>
+        </p:style>
+      </p:cxnSp>
+      <p:cxnSp>
+        <p:nvCxnSpPr>
+          <p:cNvPr id="13" name="Straight Connector 12">
+            <a:extLst>
+              <a:ext uri="{FF2B5EF4-FFF2-40B4-BE49-F238E27FC236}">
+                <a16:creationId xmlns:a16="http://schemas.microsoft.com/office/drawing/2014/main" id="{EDFCC665-4660-8A92-F6E6-6C664E9F0B79}"/>
+              </a:ext>
+            </a:extLst>
+          </p:cNvPr>
+          <p:cNvCxnSpPr>
+            <a:cxnSpLocks/>
+          </p:cNvCxnSpPr>
+          <p:nvPr/>
+        </p:nvCxnSpPr>
+        <p:spPr>
+          <a:xfrm>
+            <a:off x="7551683" y="3797043"/>
+            <a:ext cx="0" cy="284516"/>
+          </a:xfrm>
+          <a:prstGeom prst="line">
+            <a:avLst/>
+          </a:prstGeom>
+          <a:ln w="38100">
+            <a:solidFill>
+              <a:schemeClr val="accent1"/>
+            </a:solidFill>
+            <a:prstDash val="solid"/>
+          </a:ln>
+        </p:spPr>
+        <p:style>
+          <a:lnRef idx="1">
+            <a:schemeClr val="accent1"/>
+          </a:lnRef>
+          <a:fillRef idx="0">
+            <a:schemeClr val="accent1"/>
+          </a:fillRef>
+          <a:effectRef idx="0">
+            <a:schemeClr val="accent1"/>
+          </a:effectRef>
+          <a:fontRef idx="minor">
+            <a:schemeClr val="tx1"/>
+          </a:fontRef>
+        </p:style>
+      </p:cxnSp>
+      <mc:AlternateContent xmlns:mc="http://schemas.openxmlformats.org/markup-compatibility/2006" xmlns:a14="http://schemas.microsoft.com/office/drawing/2010/main">
+        <mc:Choice Requires="a14">
+          <p:sp>
+            <p:nvSpPr>
+              <p:cNvPr id="14" name="TextBox 13">
+                <a:extLst>
+                  <a:ext uri="{FF2B5EF4-FFF2-40B4-BE49-F238E27FC236}">
+                    <a16:creationId xmlns:a16="http://schemas.microsoft.com/office/drawing/2014/main" id="{47EC3FDC-7668-6C6F-0117-91CAE397469A}"/>
+                  </a:ext>
+                </a:extLst>
+              </p:cNvPr>
+              <p:cNvSpPr txBox="1"/>
+              <p:nvPr/>
+            </p:nvSpPr>
+            <p:spPr>
+              <a:xfrm>
+                <a:off x="6745128" y="4058700"/>
+                <a:ext cx="365805" cy="369332"/>
+              </a:xfrm>
+              <a:prstGeom prst="rect">
+                <a:avLst/>
+              </a:prstGeom>
+              <a:noFill/>
+              <a:ln>
+                <a:noFill/>
+              </a:ln>
+            </p:spPr>
+            <p:txBody>
+              <a:bodyPr wrap="none" rtlCol="0">
+                <a:spAutoFit/>
+              </a:bodyPr>
+              <a:lstStyle/>
+              <a:p>
+                <a:pPr/>
+                <a14:m>
+                  <m:oMathPara xmlns:m="http://schemas.openxmlformats.org/officeDocument/2006/math">
+                    <m:oMathParaPr>
+                      <m:jc m:val="centerGroup"/>
+                    </m:oMathParaPr>
+                    <m:oMath xmlns:m="http://schemas.openxmlformats.org/officeDocument/2006/math">
+                      <m:r>
+                        <a:rPr lang="en-US" b="0" i="1" smtClean="0">
+                          <a:solidFill>
+                            <a:schemeClr val="accent1"/>
+                          </a:solidFill>
+                          <a:latin typeface="Cambria Math" panose="02040503050406030204" pitchFamily="18" charset="0"/>
+                        </a:rPr>
+                        <m:t>1</m:t>
+                      </m:r>
+                    </m:oMath>
+                  </m:oMathPara>
+                </a14:m>
+                <a:endParaRPr lang="en-US" dirty="0">
+                  <a:solidFill>
+                    <a:schemeClr val="accent1"/>
+                  </a:solidFill>
+                </a:endParaRPr>
+              </a:p>
+            </p:txBody>
+          </p:sp>
+        </mc:Choice>
+        <mc:Fallback xmlns="">
+          <p:sp>
+            <p:nvSpPr>
+              <p:cNvPr id="14" name="TextBox 13">
+                <a:extLst>
+                  <a:ext uri="{FF2B5EF4-FFF2-40B4-BE49-F238E27FC236}">
+                    <a16:creationId xmlns:a16="http://schemas.microsoft.com/office/drawing/2014/main" id="{47EC3FDC-7668-6C6F-0117-91CAE397469A}"/>
+                  </a:ext>
+                </a:extLst>
+              </p:cNvPr>
+              <p:cNvSpPr txBox="1">
+                <a:spLocks noRot="1" noChangeAspect="1" noMove="1" noResize="1" noEditPoints="1" noAdjustHandles="1" noChangeArrowheads="1" noChangeShapeType="1" noTextEdit="1"/>
+              </p:cNvSpPr>
+              <p:nvPr/>
+            </p:nvSpPr>
+            <p:spPr>
+              <a:xfrm>
+                <a:off x="6745128" y="4058700"/>
+                <a:ext cx="365805" cy="369332"/>
+              </a:xfrm>
+              <a:prstGeom prst="rect">
+                <a:avLst/>
+              </a:prstGeom>
+              <a:blipFill>
+                <a:blip r:embed="rId4"/>
+                <a:stretch>
+                  <a:fillRect/>
+                </a:stretch>
+              </a:blipFill>
+              <a:ln>
+                <a:noFill/>
+              </a:ln>
+            </p:spPr>
+            <p:txBody>
+              <a:bodyPr/>
+              <a:lstStyle/>
+              <a:p>
+                <a:r>
+                  <a:rPr lang="en-US">
+                    <a:noFill/>
+                  </a:rPr>
+                  <a:t> </a:t>
+                </a:r>
+              </a:p>
+            </p:txBody>
+          </p:sp>
+        </mc:Fallback>
+      </mc:AlternateContent>
+      <mc:AlternateContent xmlns:mc="http://schemas.openxmlformats.org/markup-compatibility/2006" xmlns:a14="http://schemas.microsoft.com/office/drawing/2010/main">
+        <mc:Choice Requires="a14">
+          <p:sp>
+            <p:nvSpPr>
+              <p:cNvPr id="15" name="TextBox 14">
+                <a:extLst>
+                  <a:ext uri="{FF2B5EF4-FFF2-40B4-BE49-F238E27FC236}">
+                    <a16:creationId xmlns:a16="http://schemas.microsoft.com/office/drawing/2014/main" id="{566ABBA5-EF2A-31B9-C9C7-A356CDA17F02}"/>
+                  </a:ext>
+                </a:extLst>
+              </p:cNvPr>
+              <p:cNvSpPr txBox="1"/>
+              <p:nvPr/>
+            </p:nvSpPr>
+            <p:spPr>
+              <a:xfrm>
+                <a:off x="1130432" y="3370459"/>
+                <a:ext cx="1692066" cy="369332"/>
+              </a:xfrm>
+              <a:prstGeom prst="rect">
+                <a:avLst/>
+              </a:prstGeom>
+              <a:noFill/>
+            </p:spPr>
+            <p:txBody>
+              <a:bodyPr wrap="none" rtlCol="0">
+                <a:spAutoFit/>
+              </a:bodyPr>
+              <a:lstStyle/>
+              <a:p>
+                <a:pPr/>
+                <a14:m>
+                  <m:oMathPara xmlns:m="http://schemas.openxmlformats.org/officeDocument/2006/math">
+                    <m:oMathParaPr>
+                      <m:jc m:val="centerGroup"/>
+                    </m:oMathParaPr>
+                    <m:oMath xmlns:m="http://schemas.openxmlformats.org/officeDocument/2006/math">
+                      <m:sSub>
+                        <m:sSubPr>
+                          <m:ctrlPr>
+                            <a:rPr lang="en-US" b="0" i="1" smtClean="0">
+                              <a:solidFill>
+                                <a:schemeClr val="accent1"/>
+                              </a:solidFill>
+                              <a:latin typeface="Cambria Math" panose="02040503050406030204" pitchFamily="18" charset="0"/>
+                            </a:rPr>
+                          </m:ctrlPr>
+                        </m:sSubPr>
+                        <m:e>
+                          <m:r>
+                            <a:rPr lang="en-US" b="0" i="1" smtClean="0">
+                              <a:solidFill>
+                                <a:schemeClr val="accent1"/>
+                              </a:solidFill>
+                              <a:latin typeface="Cambria Math" panose="02040503050406030204" pitchFamily="18" charset="0"/>
+                            </a:rPr>
+                            <m:t>𝛾</m:t>
+                          </m:r>
+                        </m:e>
+                        <m:sub>
+                          <m:r>
+                            <a:rPr lang="en-US" b="0" i="1" smtClean="0">
+                              <a:solidFill>
+                                <a:schemeClr val="accent1"/>
+                              </a:solidFill>
+                              <a:latin typeface="Cambria Math" panose="02040503050406030204" pitchFamily="18" charset="0"/>
+                            </a:rPr>
+                            <m:t>00</m:t>
+                          </m:r>
+                        </m:sub>
+                      </m:sSub>
+                      <m:r>
+                        <a:rPr lang="en-US" b="0" i="1" smtClean="0">
+                          <a:latin typeface="Cambria Math" panose="02040503050406030204" pitchFamily="18" charset="0"/>
+                        </a:rPr>
+                        <m:t>+</m:t>
+                      </m:r>
+                      <m:sSub>
+                        <m:sSubPr>
+                          <m:ctrlPr>
+                            <a:rPr lang="en-US" b="0" i="1" smtClean="0">
+                              <a:solidFill>
+                                <a:srgbClr val="FF0000"/>
+                              </a:solidFill>
+                              <a:latin typeface="Cambria Math" panose="02040503050406030204" pitchFamily="18" charset="0"/>
+                            </a:rPr>
+                          </m:ctrlPr>
+                        </m:sSubPr>
+                        <m:e>
+                          <m:r>
+                            <a:rPr lang="en-US" b="0" i="1" smtClean="0">
+                              <a:solidFill>
+                                <a:srgbClr val="FF0000"/>
+                              </a:solidFill>
+                              <a:latin typeface="Cambria Math" panose="02040503050406030204" pitchFamily="18" charset="0"/>
+                            </a:rPr>
+                            <m:t>𝜁</m:t>
+                          </m:r>
+                        </m:e>
+                        <m:sub>
+                          <m:r>
+                            <a:rPr lang="en-US" b="0" i="1" smtClean="0">
+                              <a:solidFill>
+                                <a:srgbClr val="FF0000"/>
+                              </a:solidFill>
+                              <a:latin typeface="Cambria Math" panose="02040503050406030204" pitchFamily="18" charset="0"/>
+                            </a:rPr>
+                            <m:t>0</m:t>
+                          </m:r>
+                          <m:r>
+                            <a:rPr lang="en-US" b="0" i="1" smtClean="0">
+                              <a:solidFill>
+                                <a:srgbClr val="FF0000"/>
+                              </a:solidFill>
+                              <a:latin typeface="Cambria Math" panose="02040503050406030204" pitchFamily="18" charset="0"/>
+                            </a:rPr>
+                            <m:t>𝑖</m:t>
+                          </m:r>
+                        </m:sub>
+                      </m:sSub>
+                      <m:r>
+                        <a:rPr lang="en-US" b="0" i="1" smtClean="0">
+                          <a:latin typeface="Cambria Math" panose="02040503050406030204" pitchFamily="18" charset="0"/>
+                        </a:rPr>
+                        <m:t>=</m:t>
+                      </m:r>
+                      <m:sSub>
+                        <m:sSubPr>
+                          <m:ctrlPr>
+                            <a:rPr lang="en-US" b="0" i="1" smtClean="0">
+                              <a:solidFill>
+                                <a:schemeClr val="accent6">
+                                  <a:lumMod val="75000"/>
+                                </a:schemeClr>
+                              </a:solidFill>
+                              <a:latin typeface="Cambria Math" panose="02040503050406030204" pitchFamily="18" charset="0"/>
+                            </a:rPr>
+                          </m:ctrlPr>
+                        </m:sSubPr>
+                        <m:e>
+                          <m:r>
+                            <a:rPr lang="en-US" b="0" i="1" smtClean="0">
+                              <a:solidFill>
+                                <a:schemeClr val="accent6">
+                                  <a:lumMod val="75000"/>
+                                </a:schemeClr>
+                              </a:solidFill>
+                              <a:latin typeface="Cambria Math" panose="02040503050406030204" pitchFamily="18" charset="0"/>
+                            </a:rPr>
+                            <m:t>𝛽</m:t>
+                          </m:r>
+                        </m:e>
+                        <m:sub>
+                          <m:r>
+                            <a:rPr lang="en-US" b="0" i="1" smtClean="0">
+                              <a:solidFill>
+                                <a:schemeClr val="accent6">
+                                  <a:lumMod val="75000"/>
+                                </a:schemeClr>
+                              </a:solidFill>
+                              <a:latin typeface="Cambria Math" panose="02040503050406030204" pitchFamily="18" charset="0"/>
+                            </a:rPr>
+                            <m:t>0</m:t>
+                          </m:r>
+                          <m:r>
+                            <a:rPr lang="en-US" b="0" i="1" smtClean="0">
+                              <a:solidFill>
+                                <a:schemeClr val="accent6">
+                                  <a:lumMod val="75000"/>
+                                </a:schemeClr>
+                              </a:solidFill>
+                              <a:latin typeface="Cambria Math" panose="02040503050406030204" pitchFamily="18" charset="0"/>
+                            </a:rPr>
+                            <m:t>𝑖</m:t>
+                          </m:r>
+                        </m:sub>
+                      </m:sSub>
+                    </m:oMath>
+                  </m:oMathPara>
+                </a14:m>
+                <a:endParaRPr lang="en-US" dirty="0"/>
+              </a:p>
+            </p:txBody>
+          </p:sp>
+        </mc:Choice>
+        <mc:Fallback xmlns="">
+          <p:sp>
+            <p:nvSpPr>
+              <p:cNvPr id="15" name="TextBox 14">
+                <a:extLst>
+                  <a:ext uri="{FF2B5EF4-FFF2-40B4-BE49-F238E27FC236}">
+                    <a16:creationId xmlns:a16="http://schemas.microsoft.com/office/drawing/2014/main" id="{566ABBA5-EF2A-31B9-C9C7-A356CDA17F02}"/>
+                  </a:ext>
+                </a:extLst>
+              </p:cNvPr>
+              <p:cNvSpPr txBox="1">
+                <a:spLocks noRot="1" noChangeAspect="1" noMove="1" noResize="1" noEditPoints="1" noAdjustHandles="1" noChangeArrowheads="1" noChangeShapeType="1" noTextEdit="1"/>
+              </p:cNvSpPr>
+              <p:nvPr/>
+            </p:nvSpPr>
+            <p:spPr>
+              <a:xfrm>
+                <a:off x="1130432" y="3370459"/>
+                <a:ext cx="1692066" cy="369332"/>
+              </a:xfrm>
+              <a:prstGeom prst="rect">
+                <a:avLst/>
+              </a:prstGeom>
+              <a:blipFill>
+                <a:blip r:embed="rId5"/>
+                <a:stretch>
+                  <a:fillRect b="-13333"/>
+                </a:stretch>
+              </a:blipFill>
+            </p:spPr>
+            <p:txBody>
+              <a:bodyPr/>
+              <a:lstStyle/>
+              <a:p>
+                <a:r>
+                  <a:rPr lang="en-US">
+                    <a:noFill/>
+                  </a:rPr>
+                  <a:t> </a:t>
+                </a:r>
+              </a:p>
+            </p:txBody>
+          </p:sp>
+        </mc:Fallback>
+      </mc:AlternateContent>
+      <p:cxnSp>
+        <p:nvCxnSpPr>
+          <p:cNvPr id="16" name="Straight Connector 15">
+            <a:extLst>
+              <a:ext uri="{FF2B5EF4-FFF2-40B4-BE49-F238E27FC236}">
+                <a16:creationId xmlns:a16="http://schemas.microsoft.com/office/drawing/2014/main" id="{24766559-A96B-B32E-A59E-78BC23C96F85}"/>
+              </a:ext>
+            </a:extLst>
+          </p:cNvPr>
+          <p:cNvCxnSpPr/>
+          <p:nvPr/>
+        </p:nvCxnSpPr>
+        <p:spPr>
+          <a:xfrm>
+            <a:off x="6273527" y="2381691"/>
+            <a:ext cx="1236883" cy="0"/>
+          </a:xfrm>
+          <a:prstGeom prst="line">
+            <a:avLst/>
+          </a:prstGeom>
+          <a:ln w="38100">
+            <a:solidFill>
+              <a:schemeClr val="accent1"/>
+            </a:solidFill>
+            <a:prstDash val="solid"/>
+          </a:ln>
+        </p:spPr>
+        <p:style>
+          <a:lnRef idx="1">
+            <a:schemeClr val="accent1"/>
+          </a:lnRef>
+          <a:fillRef idx="0">
+            <a:schemeClr val="accent1"/>
+          </a:fillRef>
+          <a:effectRef idx="0">
+            <a:schemeClr val="accent1"/>
+          </a:effectRef>
+          <a:fontRef idx="minor">
+            <a:schemeClr val="tx1"/>
+          </a:fontRef>
+        </p:style>
+      </p:cxnSp>
+      <mc:AlternateContent xmlns:mc="http://schemas.openxmlformats.org/markup-compatibility/2006" xmlns:a14="http://schemas.microsoft.com/office/drawing/2010/main">
+        <mc:Choice Requires="a14">
+          <p:sp>
+            <p:nvSpPr>
+              <p:cNvPr id="18" name="TextBox 17">
+                <a:extLst>
+                  <a:ext uri="{FF2B5EF4-FFF2-40B4-BE49-F238E27FC236}">
+                    <a16:creationId xmlns:a16="http://schemas.microsoft.com/office/drawing/2014/main" id="{2F06C7B2-C4EB-EDD9-83B2-317A3F2EFDAC}"/>
+                  </a:ext>
+                </a:extLst>
+              </p:cNvPr>
+              <p:cNvSpPr txBox="1"/>
+              <p:nvPr/>
+            </p:nvSpPr>
+            <p:spPr>
+              <a:xfrm>
+                <a:off x="3120916" y="4028536"/>
+                <a:ext cx="505908" cy="369332"/>
+              </a:xfrm>
+              <a:prstGeom prst="rect">
+                <a:avLst/>
+              </a:prstGeom>
+              <a:noFill/>
+            </p:spPr>
+            <p:txBody>
+              <a:bodyPr wrap="none" rtlCol="0">
+                <a:spAutoFit/>
+              </a:bodyPr>
+              <a:lstStyle/>
+              <a:p>
+                <a:pPr/>
+                <a14:m>
+                  <m:oMathPara xmlns:m="http://schemas.openxmlformats.org/officeDocument/2006/math">
+                    <m:oMathParaPr>
+                      <m:jc m:val="centerGroup"/>
+                    </m:oMathParaPr>
+                    <m:oMath xmlns:m="http://schemas.openxmlformats.org/officeDocument/2006/math">
+                      <m:sSub>
+                        <m:sSubPr>
+                          <m:ctrlPr>
+                            <a:rPr lang="en-US" b="0" i="1" smtClean="0">
+                              <a:solidFill>
+                                <a:srgbClr val="FF0000"/>
+                              </a:solidFill>
+                              <a:latin typeface="Cambria Math" panose="02040503050406030204" pitchFamily="18" charset="0"/>
+                            </a:rPr>
+                          </m:ctrlPr>
+                        </m:sSubPr>
+                        <m:e>
+                          <m:r>
+                            <a:rPr lang="en-US" b="0" i="1" smtClean="0">
+                              <a:solidFill>
+                                <a:srgbClr val="FF0000"/>
+                              </a:solidFill>
+                              <a:latin typeface="Cambria Math" panose="02040503050406030204" pitchFamily="18" charset="0"/>
+                            </a:rPr>
+                            <m:t>𝜁</m:t>
+                          </m:r>
+                        </m:e>
+                        <m:sub>
+                          <m:r>
+                            <a:rPr lang="en-US" b="0" i="1" smtClean="0">
+                              <a:solidFill>
+                                <a:srgbClr val="FF0000"/>
+                              </a:solidFill>
+                              <a:latin typeface="Cambria Math" panose="02040503050406030204" pitchFamily="18" charset="0"/>
+                            </a:rPr>
+                            <m:t>0</m:t>
+                          </m:r>
+                          <m:r>
+                            <a:rPr lang="en-US" b="0" i="1" smtClean="0">
+                              <a:solidFill>
+                                <a:srgbClr val="FF0000"/>
+                              </a:solidFill>
+                              <a:latin typeface="Cambria Math" panose="02040503050406030204" pitchFamily="18" charset="0"/>
+                            </a:rPr>
+                            <m:t>𝑖</m:t>
+                          </m:r>
+                        </m:sub>
+                      </m:sSub>
+                    </m:oMath>
+                  </m:oMathPara>
+                </a14:m>
+                <a:endParaRPr lang="en-US" dirty="0">
+                  <a:solidFill>
+                    <a:srgbClr val="FF0000"/>
+                  </a:solidFill>
+                </a:endParaRPr>
+              </a:p>
+            </p:txBody>
+          </p:sp>
+        </mc:Choice>
+        <mc:Fallback xmlns="">
+          <p:sp>
+            <p:nvSpPr>
+              <p:cNvPr id="18" name="TextBox 17">
+                <a:extLst>
+                  <a:ext uri="{FF2B5EF4-FFF2-40B4-BE49-F238E27FC236}">
+                    <a16:creationId xmlns:a16="http://schemas.microsoft.com/office/drawing/2014/main" id="{2F06C7B2-C4EB-EDD9-83B2-317A3F2EFDAC}"/>
+                  </a:ext>
+                </a:extLst>
+              </p:cNvPr>
+              <p:cNvSpPr txBox="1">
+                <a:spLocks noRot="1" noChangeAspect="1" noMove="1" noResize="1" noEditPoints="1" noAdjustHandles="1" noChangeArrowheads="1" noChangeShapeType="1" noTextEdit="1"/>
+              </p:cNvSpPr>
+              <p:nvPr/>
+            </p:nvSpPr>
+            <p:spPr>
+              <a:xfrm>
+                <a:off x="3120916" y="4028536"/>
+                <a:ext cx="505908" cy="369332"/>
+              </a:xfrm>
+              <a:prstGeom prst="rect">
+                <a:avLst/>
+              </a:prstGeom>
+              <a:blipFill>
+                <a:blip r:embed="rId6"/>
+                <a:stretch>
+                  <a:fillRect b="-10000"/>
+                </a:stretch>
+              </a:blipFill>
+            </p:spPr>
+            <p:txBody>
+              <a:bodyPr/>
+              <a:lstStyle/>
+              <a:p>
+                <a:r>
+                  <a:rPr lang="en-US">
+                    <a:noFill/>
+                  </a:rPr>
+                  <a:t> </a:t>
+                </a:r>
+              </a:p>
+            </p:txBody>
+          </p:sp>
+        </mc:Fallback>
+      </mc:AlternateContent>
+      <mc:AlternateContent xmlns:mc="http://schemas.openxmlformats.org/markup-compatibility/2006" xmlns:a14="http://schemas.microsoft.com/office/drawing/2010/main">
+        <mc:Choice Requires="a14">
+          <p:sp>
+            <p:nvSpPr>
+              <p:cNvPr id="19" name="TextBox 18">
+                <a:extLst>
+                  <a:ext uri="{FF2B5EF4-FFF2-40B4-BE49-F238E27FC236}">
+                    <a16:creationId xmlns:a16="http://schemas.microsoft.com/office/drawing/2014/main" id="{BE6A1B76-4C7A-FE91-A009-BF142BB97D5F}"/>
+                  </a:ext>
+                </a:extLst>
+              </p:cNvPr>
+              <p:cNvSpPr txBox="1"/>
+              <p:nvPr/>
+            </p:nvSpPr>
+            <p:spPr>
+              <a:xfrm>
+                <a:off x="7541172" y="2080982"/>
+                <a:ext cx="551498" cy="369332"/>
+              </a:xfrm>
+              <a:prstGeom prst="rect">
+                <a:avLst/>
+              </a:prstGeom>
+              <a:noFill/>
+            </p:spPr>
+            <p:txBody>
+              <a:bodyPr wrap="none" rtlCol="0">
+                <a:spAutoFit/>
+              </a:bodyPr>
+              <a:lstStyle/>
+              <a:p>
+                <a:pPr/>
+                <a14:m>
+                  <m:oMathPara xmlns:m="http://schemas.openxmlformats.org/officeDocument/2006/math">
+                    <m:oMathParaPr>
+                      <m:jc m:val="centerGroup"/>
+                    </m:oMathParaPr>
+                    <m:oMath xmlns:m="http://schemas.openxmlformats.org/officeDocument/2006/math">
+                      <m:sSub>
+                        <m:sSubPr>
+                          <m:ctrlPr>
+                            <a:rPr lang="en-US" b="0" i="1" smtClean="0">
+                              <a:solidFill>
+                                <a:schemeClr val="accent1"/>
+                              </a:solidFill>
+                              <a:latin typeface="Cambria Math" panose="02040503050406030204" pitchFamily="18" charset="0"/>
+                            </a:rPr>
+                          </m:ctrlPr>
+                        </m:sSubPr>
+                        <m:e>
+                          <m:r>
+                            <a:rPr lang="en-US" b="0" i="1" smtClean="0">
+                              <a:solidFill>
+                                <a:schemeClr val="accent1"/>
+                              </a:solidFill>
+                              <a:latin typeface="Cambria Math" panose="02040503050406030204" pitchFamily="18" charset="0"/>
+                            </a:rPr>
+                            <m:t>𝛾</m:t>
+                          </m:r>
+                        </m:e>
+                        <m:sub>
+                          <m:r>
+                            <a:rPr lang="en-US" b="0" i="1" smtClean="0">
+                              <a:solidFill>
+                                <a:schemeClr val="accent1"/>
+                              </a:solidFill>
+                              <a:latin typeface="Cambria Math" panose="02040503050406030204" pitchFamily="18" charset="0"/>
+                            </a:rPr>
+                            <m:t>10</m:t>
+                          </m:r>
+                        </m:sub>
+                      </m:sSub>
+                    </m:oMath>
+                  </m:oMathPara>
+                </a14:m>
+                <a:endParaRPr lang="en-US" dirty="0"/>
+              </a:p>
+            </p:txBody>
+          </p:sp>
+        </mc:Choice>
+        <mc:Fallback xmlns="">
+          <p:sp>
+            <p:nvSpPr>
+              <p:cNvPr id="19" name="TextBox 18">
+                <a:extLst>
+                  <a:ext uri="{FF2B5EF4-FFF2-40B4-BE49-F238E27FC236}">
+                    <a16:creationId xmlns:a16="http://schemas.microsoft.com/office/drawing/2014/main" id="{BE6A1B76-4C7A-FE91-A009-BF142BB97D5F}"/>
+                  </a:ext>
+                </a:extLst>
+              </p:cNvPr>
+              <p:cNvSpPr txBox="1">
+                <a:spLocks noRot="1" noChangeAspect="1" noMove="1" noResize="1" noEditPoints="1" noAdjustHandles="1" noChangeArrowheads="1" noChangeShapeType="1" noTextEdit="1"/>
+              </p:cNvSpPr>
+              <p:nvPr/>
+            </p:nvSpPr>
+            <p:spPr>
+              <a:xfrm>
+                <a:off x="7541172" y="2080982"/>
+                <a:ext cx="551498" cy="369332"/>
+              </a:xfrm>
+              <a:prstGeom prst="rect">
+                <a:avLst/>
+              </a:prstGeom>
+              <a:blipFill>
+                <a:blip r:embed="rId7"/>
+                <a:stretch>
+                  <a:fillRect b="-10000"/>
+                </a:stretch>
+              </a:blipFill>
+            </p:spPr>
+            <p:txBody>
+              <a:bodyPr/>
+              <a:lstStyle/>
+              <a:p>
+                <a:r>
+                  <a:rPr lang="en-US">
+                    <a:noFill/>
+                  </a:rPr>
+                  <a:t> </a:t>
+                </a:r>
+              </a:p>
+            </p:txBody>
+          </p:sp>
+        </mc:Fallback>
+      </mc:AlternateContent>
+      <p:cxnSp>
+        <p:nvCxnSpPr>
+          <p:cNvPr id="20" name="Straight Connector 19">
+            <a:extLst>
+              <a:ext uri="{FF2B5EF4-FFF2-40B4-BE49-F238E27FC236}">
+                <a16:creationId xmlns:a16="http://schemas.microsoft.com/office/drawing/2014/main" id="{604335DA-E7D9-2C67-53DB-F645648FCA5C}"/>
+              </a:ext>
+            </a:extLst>
+          </p:cNvPr>
+          <p:cNvCxnSpPr>
+            <a:cxnSpLocks/>
+          </p:cNvCxnSpPr>
+          <p:nvPr/>
+        </p:nvCxnSpPr>
+        <p:spPr>
+          <a:xfrm>
+            <a:off x="7520921" y="2107317"/>
+            <a:ext cx="0" cy="284516"/>
+          </a:xfrm>
+          <a:prstGeom prst="line">
+            <a:avLst/>
+          </a:prstGeom>
+          <a:ln w="38100">
+            <a:solidFill>
+              <a:schemeClr val="accent1"/>
+            </a:solidFill>
+            <a:prstDash val="solid"/>
+          </a:ln>
+        </p:spPr>
+        <p:style>
+          <a:lnRef idx="1">
+            <a:schemeClr val="accent1"/>
+          </a:lnRef>
+          <a:fillRef idx="0">
+            <a:schemeClr val="accent1"/>
+          </a:fillRef>
+          <a:effectRef idx="0">
+            <a:schemeClr val="accent1"/>
+          </a:effectRef>
+          <a:fontRef idx="minor">
+            <a:schemeClr val="tx1"/>
+          </a:fontRef>
+        </p:style>
+      </p:cxnSp>
+      <mc:AlternateContent xmlns:mc="http://schemas.openxmlformats.org/markup-compatibility/2006" xmlns:a14="http://schemas.microsoft.com/office/drawing/2010/main">
+        <mc:Choice Requires="a14">
+          <p:sp>
+            <p:nvSpPr>
+              <p:cNvPr id="21" name="TextBox 20">
+                <a:extLst>
+                  <a:ext uri="{FF2B5EF4-FFF2-40B4-BE49-F238E27FC236}">
+                    <a16:creationId xmlns:a16="http://schemas.microsoft.com/office/drawing/2014/main" id="{0B2274A8-9DE0-CEE3-498C-59207D23474C}"/>
+                  </a:ext>
+                </a:extLst>
+              </p:cNvPr>
+              <p:cNvSpPr txBox="1"/>
+              <p:nvPr/>
+            </p:nvSpPr>
+            <p:spPr>
+              <a:xfrm>
+                <a:off x="6714366" y="2368974"/>
+                <a:ext cx="365805" cy="369332"/>
+              </a:xfrm>
+              <a:prstGeom prst="rect">
+                <a:avLst/>
+              </a:prstGeom>
+              <a:noFill/>
+            </p:spPr>
+            <p:txBody>
+              <a:bodyPr wrap="none" rtlCol="0">
+                <a:spAutoFit/>
+              </a:bodyPr>
+              <a:lstStyle/>
+              <a:p>
+                <a:pPr/>
+                <a14:m>
+                  <m:oMathPara xmlns:m="http://schemas.openxmlformats.org/officeDocument/2006/math">
+                    <m:oMathParaPr>
+                      <m:jc m:val="centerGroup"/>
+                    </m:oMathParaPr>
+                    <m:oMath xmlns:m="http://schemas.openxmlformats.org/officeDocument/2006/math">
+                      <m:r>
+                        <a:rPr lang="en-US" b="0" i="1" smtClean="0">
+                          <a:solidFill>
+                            <a:schemeClr val="accent1"/>
+                          </a:solidFill>
+                          <a:latin typeface="Cambria Math" panose="02040503050406030204" pitchFamily="18" charset="0"/>
+                        </a:rPr>
+                        <m:t>1</m:t>
+                      </m:r>
+                    </m:oMath>
+                  </m:oMathPara>
+                </a14:m>
+                <a:endParaRPr lang="en-US" dirty="0">
+                  <a:solidFill>
+                    <a:schemeClr val="accent1"/>
+                  </a:solidFill>
+                </a:endParaRPr>
+              </a:p>
+            </p:txBody>
+          </p:sp>
+        </mc:Choice>
+        <mc:Fallback xmlns="">
+          <p:sp>
+            <p:nvSpPr>
+              <p:cNvPr id="21" name="TextBox 20">
+                <a:extLst>
+                  <a:ext uri="{FF2B5EF4-FFF2-40B4-BE49-F238E27FC236}">
+                    <a16:creationId xmlns:a16="http://schemas.microsoft.com/office/drawing/2014/main" id="{0B2274A8-9DE0-CEE3-498C-59207D23474C}"/>
+                  </a:ext>
+                </a:extLst>
+              </p:cNvPr>
+              <p:cNvSpPr txBox="1">
+                <a:spLocks noRot="1" noChangeAspect="1" noMove="1" noResize="1" noEditPoints="1" noAdjustHandles="1" noChangeArrowheads="1" noChangeShapeType="1" noTextEdit="1"/>
+              </p:cNvSpPr>
+              <p:nvPr/>
+            </p:nvSpPr>
+            <p:spPr>
+              <a:xfrm>
+                <a:off x="6714366" y="2368974"/>
+                <a:ext cx="365805" cy="369332"/>
+              </a:xfrm>
+              <a:prstGeom prst="rect">
+                <a:avLst/>
+              </a:prstGeom>
+              <a:blipFill>
+                <a:blip r:embed="rId8"/>
+                <a:stretch>
+                  <a:fillRect/>
+                </a:stretch>
+              </a:blipFill>
+            </p:spPr>
+            <p:txBody>
+              <a:bodyPr/>
+              <a:lstStyle/>
+              <a:p>
+                <a:r>
+                  <a:rPr lang="en-US">
+                    <a:noFill/>
+                  </a:rPr>
+                  <a:t> </a:t>
+                </a:r>
+              </a:p>
+            </p:txBody>
+          </p:sp>
+        </mc:Fallback>
+      </mc:AlternateContent>
+      <p:cxnSp>
+        <p:nvCxnSpPr>
+          <p:cNvPr id="22" name="Straight Connector 21">
+            <a:extLst>
+              <a:ext uri="{FF2B5EF4-FFF2-40B4-BE49-F238E27FC236}">
+                <a16:creationId xmlns:a16="http://schemas.microsoft.com/office/drawing/2014/main" id="{CAC2AD91-142F-CB83-96E8-EDC2DCB22E0B}"/>
+              </a:ext>
+            </a:extLst>
+          </p:cNvPr>
+          <p:cNvCxnSpPr>
+            <a:cxnSpLocks/>
+          </p:cNvCxnSpPr>
+          <p:nvPr/>
+        </p:nvCxnSpPr>
+        <p:spPr>
+          <a:xfrm>
+            <a:off x="7520921" y="1831976"/>
+            <a:ext cx="0" cy="275341"/>
+          </a:xfrm>
+          <a:prstGeom prst="line">
+            <a:avLst/>
+          </a:prstGeom>
+          <a:ln w="38100">
+            <a:solidFill>
+              <a:srgbClr val="FF0000"/>
+            </a:solidFill>
+            <a:headEnd type="arrow" w="med" len="med"/>
+            <a:tailEnd type="none" w="med" len="med"/>
+          </a:ln>
+        </p:spPr>
+        <p:style>
+          <a:lnRef idx="1">
+            <a:schemeClr val="accent1"/>
+          </a:lnRef>
+          <a:fillRef idx="0">
+            <a:schemeClr val="accent1"/>
+          </a:fillRef>
+          <a:effectRef idx="0">
+            <a:schemeClr val="accent1"/>
+          </a:effectRef>
+          <a:fontRef idx="minor">
+            <a:schemeClr val="tx1"/>
+          </a:fontRef>
+        </p:style>
+      </p:cxnSp>
+      <mc:AlternateContent xmlns:mc="http://schemas.openxmlformats.org/markup-compatibility/2006" xmlns:a14="http://schemas.microsoft.com/office/drawing/2010/main">
+        <mc:Choice Requires="a14">
+          <p:sp>
+            <p:nvSpPr>
+              <p:cNvPr id="23" name="TextBox 22">
+                <a:extLst>
+                  <a:ext uri="{FF2B5EF4-FFF2-40B4-BE49-F238E27FC236}">
+                    <a16:creationId xmlns:a16="http://schemas.microsoft.com/office/drawing/2014/main" id="{547EB446-7BA1-4B25-0C31-A5E47608A910}"/>
+                  </a:ext>
+                </a:extLst>
+              </p:cNvPr>
+              <p:cNvSpPr txBox="1"/>
+              <p:nvPr/>
+            </p:nvSpPr>
+            <p:spPr>
+              <a:xfrm>
+                <a:off x="7566628" y="1772281"/>
+                <a:ext cx="500586" cy="369332"/>
+              </a:xfrm>
+              <a:prstGeom prst="rect">
+                <a:avLst/>
+              </a:prstGeom>
+              <a:noFill/>
+            </p:spPr>
+            <p:txBody>
+              <a:bodyPr wrap="none" rtlCol="0">
+                <a:spAutoFit/>
+              </a:bodyPr>
+              <a:lstStyle/>
+              <a:p>
+                <a:pPr/>
+                <a14:m>
+                  <m:oMathPara xmlns:m="http://schemas.openxmlformats.org/officeDocument/2006/math">
+                    <m:oMathParaPr>
+                      <m:jc m:val="centerGroup"/>
+                    </m:oMathParaPr>
+                    <m:oMath xmlns:m="http://schemas.openxmlformats.org/officeDocument/2006/math">
+                      <m:sSub>
+                        <m:sSubPr>
+                          <m:ctrlPr>
+                            <a:rPr lang="en-US" b="0" i="1" smtClean="0">
+                              <a:solidFill>
+                                <a:srgbClr val="FF0000"/>
+                              </a:solidFill>
+                              <a:latin typeface="Cambria Math" panose="02040503050406030204" pitchFamily="18" charset="0"/>
+                            </a:rPr>
+                          </m:ctrlPr>
+                        </m:sSubPr>
+                        <m:e>
+                          <m:r>
+                            <a:rPr lang="en-US" b="0" i="1" smtClean="0">
+                              <a:solidFill>
+                                <a:srgbClr val="FF0000"/>
+                              </a:solidFill>
+                              <a:latin typeface="Cambria Math" panose="02040503050406030204" pitchFamily="18" charset="0"/>
+                            </a:rPr>
+                            <m:t>𝜁</m:t>
+                          </m:r>
+                        </m:e>
+                        <m:sub>
+                          <m:r>
+                            <a:rPr lang="en-US" b="0" i="1" smtClean="0">
+                              <a:solidFill>
+                                <a:srgbClr val="FF0000"/>
+                              </a:solidFill>
+                              <a:latin typeface="Cambria Math" panose="02040503050406030204" pitchFamily="18" charset="0"/>
+                            </a:rPr>
+                            <m:t>1</m:t>
+                          </m:r>
+                          <m:r>
+                            <a:rPr lang="en-US" b="0" i="1" smtClean="0">
+                              <a:solidFill>
+                                <a:srgbClr val="FF0000"/>
+                              </a:solidFill>
+                              <a:latin typeface="Cambria Math" panose="02040503050406030204" pitchFamily="18" charset="0"/>
+                            </a:rPr>
+                            <m:t>𝑖</m:t>
+                          </m:r>
+                        </m:sub>
+                      </m:sSub>
+                    </m:oMath>
+                  </m:oMathPara>
+                </a14:m>
+                <a:endParaRPr lang="en-US" dirty="0"/>
+              </a:p>
+            </p:txBody>
+          </p:sp>
+        </mc:Choice>
+        <mc:Fallback xmlns="">
+          <p:sp>
+            <p:nvSpPr>
+              <p:cNvPr id="23" name="TextBox 22">
+                <a:extLst>
+                  <a:ext uri="{FF2B5EF4-FFF2-40B4-BE49-F238E27FC236}">
+                    <a16:creationId xmlns:a16="http://schemas.microsoft.com/office/drawing/2014/main" id="{547EB446-7BA1-4B25-0C31-A5E47608A910}"/>
+                  </a:ext>
+                </a:extLst>
+              </p:cNvPr>
+              <p:cNvSpPr txBox="1">
+                <a:spLocks noRot="1" noChangeAspect="1" noMove="1" noResize="1" noEditPoints="1" noAdjustHandles="1" noChangeArrowheads="1" noChangeShapeType="1" noTextEdit="1"/>
+              </p:cNvSpPr>
+              <p:nvPr/>
+            </p:nvSpPr>
+            <p:spPr>
+              <a:xfrm>
+                <a:off x="7566628" y="1772281"/>
+                <a:ext cx="500586" cy="369332"/>
+              </a:xfrm>
+              <a:prstGeom prst="rect">
+                <a:avLst/>
+              </a:prstGeom>
+              <a:blipFill>
+                <a:blip r:embed="rId9"/>
+                <a:stretch>
+                  <a:fillRect b="-13333"/>
+                </a:stretch>
+              </a:blipFill>
+            </p:spPr>
+            <p:txBody>
+              <a:bodyPr/>
+              <a:lstStyle/>
+              <a:p>
+                <a:r>
+                  <a:rPr lang="en-US">
+                    <a:noFill/>
+                  </a:rPr>
+                  <a:t> </a:t>
+                </a:r>
+              </a:p>
+            </p:txBody>
+          </p:sp>
+        </mc:Fallback>
+      </mc:AlternateContent>
+      <p:sp>
+        <p:nvSpPr>
+          <p:cNvPr id="24" name="Right Brace 23">
+            <a:extLst>
+              <a:ext uri="{FF2B5EF4-FFF2-40B4-BE49-F238E27FC236}">
+                <a16:creationId xmlns:a16="http://schemas.microsoft.com/office/drawing/2014/main" id="{70FBFABF-5251-42BB-82EA-7AF58596D3DF}"/>
+              </a:ext>
+            </a:extLst>
+          </p:cNvPr>
+          <p:cNvSpPr/>
+          <p:nvPr/>
+        </p:nvSpPr>
+        <p:spPr>
+          <a:xfrm>
+            <a:off x="8165588" y="1772281"/>
+            <a:ext cx="253583" cy="619552"/>
+          </a:xfrm>
+          <a:prstGeom prst="rightBrace">
+            <a:avLst/>
+          </a:prstGeom>
+          <a:ln w="12700">
+            <a:solidFill>
+              <a:schemeClr val="tx1"/>
+            </a:solidFill>
+          </a:ln>
+        </p:spPr>
+        <p:style>
+          <a:lnRef idx="1">
+            <a:schemeClr val="accent1"/>
+          </a:lnRef>
+          <a:fillRef idx="0">
+            <a:schemeClr val="accent1"/>
+          </a:fillRef>
+          <a:effectRef idx="0">
+            <a:schemeClr val="accent1"/>
+          </a:effectRef>
+          <a:fontRef idx="minor">
+            <a:schemeClr val="tx1"/>
+          </a:fontRef>
+        </p:style>
+        <p:txBody>
+          <a:bodyPr rtlCol="0" anchor="ctr"/>
+          <a:lstStyle/>
+          <a:p>
+            <a:pPr algn="ctr"/>
+            <a:endParaRPr lang="en-US"/>
+          </a:p>
+        </p:txBody>
+      </p:sp>
+      <mc:AlternateContent xmlns:mc="http://schemas.openxmlformats.org/markup-compatibility/2006" xmlns:a14="http://schemas.microsoft.com/office/drawing/2010/main">
+        <mc:Choice Requires="a14">
+          <p:sp>
+            <p:nvSpPr>
+              <p:cNvPr id="25" name="TextBox 24">
+                <a:extLst>
+                  <a:ext uri="{FF2B5EF4-FFF2-40B4-BE49-F238E27FC236}">
+                    <a16:creationId xmlns:a16="http://schemas.microsoft.com/office/drawing/2014/main" id="{A9B822BA-28B4-4188-6CD0-14D130C8E398}"/>
+                  </a:ext>
+                </a:extLst>
+              </p:cNvPr>
+              <p:cNvSpPr txBox="1"/>
+              <p:nvPr/>
+            </p:nvSpPr>
+            <p:spPr>
+              <a:xfrm>
+                <a:off x="8527766" y="1846708"/>
+                <a:ext cx="1683474" cy="369332"/>
+              </a:xfrm>
+              <a:prstGeom prst="rect">
+                <a:avLst/>
+              </a:prstGeom>
+              <a:noFill/>
+            </p:spPr>
+            <p:txBody>
+              <a:bodyPr wrap="none" rtlCol="0">
+                <a:spAutoFit/>
+              </a:bodyPr>
+              <a:lstStyle/>
+              <a:p>
+                <a:pPr/>
+                <a14:m>
+                  <m:oMathPara xmlns:m="http://schemas.openxmlformats.org/officeDocument/2006/math">
+                    <m:oMathParaPr>
+                      <m:jc m:val="centerGroup"/>
+                    </m:oMathParaPr>
+                    <m:oMath xmlns:m="http://schemas.openxmlformats.org/officeDocument/2006/math">
+                      <m:sSub>
+                        <m:sSubPr>
+                          <m:ctrlPr>
+                            <a:rPr lang="en-US" b="0" i="1" smtClean="0">
+                              <a:solidFill>
+                                <a:schemeClr val="accent1"/>
+                              </a:solidFill>
+                              <a:latin typeface="Cambria Math" panose="02040503050406030204" pitchFamily="18" charset="0"/>
+                            </a:rPr>
+                          </m:ctrlPr>
+                        </m:sSubPr>
+                        <m:e>
+                          <m:r>
+                            <a:rPr lang="en-US" b="0" i="1" smtClean="0">
+                              <a:solidFill>
+                                <a:schemeClr val="accent1"/>
+                              </a:solidFill>
+                              <a:latin typeface="Cambria Math" panose="02040503050406030204" pitchFamily="18" charset="0"/>
+                            </a:rPr>
+                            <m:t>𝛾</m:t>
+                          </m:r>
+                        </m:e>
+                        <m:sub>
+                          <m:r>
+                            <a:rPr lang="en-US" b="0" i="1" smtClean="0">
+                              <a:solidFill>
+                                <a:schemeClr val="accent1"/>
+                              </a:solidFill>
+                              <a:latin typeface="Cambria Math" panose="02040503050406030204" pitchFamily="18" charset="0"/>
+                            </a:rPr>
+                            <m:t>10</m:t>
+                          </m:r>
+                        </m:sub>
+                      </m:sSub>
+                      <m:r>
+                        <a:rPr lang="en-US" b="0" i="1" smtClean="0">
+                          <a:latin typeface="Cambria Math" panose="02040503050406030204" pitchFamily="18" charset="0"/>
+                        </a:rPr>
+                        <m:t>+</m:t>
+                      </m:r>
+                      <m:sSub>
+                        <m:sSubPr>
+                          <m:ctrlPr>
+                            <a:rPr lang="en-US" b="0" i="1" smtClean="0">
+                              <a:solidFill>
+                                <a:srgbClr val="FF0000"/>
+                              </a:solidFill>
+                              <a:latin typeface="Cambria Math" panose="02040503050406030204" pitchFamily="18" charset="0"/>
+                            </a:rPr>
+                          </m:ctrlPr>
+                        </m:sSubPr>
+                        <m:e>
+                          <m:r>
+                            <a:rPr lang="en-US" b="0" i="1" smtClean="0">
+                              <a:solidFill>
+                                <a:srgbClr val="FF0000"/>
+                              </a:solidFill>
+                              <a:latin typeface="Cambria Math" panose="02040503050406030204" pitchFamily="18" charset="0"/>
+                            </a:rPr>
+                            <m:t>𝜁</m:t>
+                          </m:r>
+                        </m:e>
+                        <m:sub>
+                          <m:r>
+                            <a:rPr lang="en-US" b="0" i="1" smtClean="0">
+                              <a:solidFill>
+                                <a:srgbClr val="FF0000"/>
+                              </a:solidFill>
+                              <a:latin typeface="Cambria Math" panose="02040503050406030204" pitchFamily="18" charset="0"/>
+                            </a:rPr>
+                            <m:t>1</m:t>
+                          </m:r>
+                          <m:r>
+                            <a:rPr lang="en-US" b="0" i="1" smtClean="0">
+                              <a:solidFill>
+                                <a:srgbClr val="FF0000"/>
+                              </a:solidFill>
+                              <a:latin typeface="Cambria Math" panose="02040503050406030204" pitchFamily="18" charset="0"/>
+                            </a:rPr>
+                            <m:t>𝑖</m:t>
+                          </m:r>
+                        </m:sub>
+                      </m:sSub>
+                      <m:r>
+                        <a:rPr lang="en-US" b="0" i="1" smtClean="0">
+                          <a:latin typeface="Cambria Math" panose="02040503050406030204" pitchFamily="18" charset="0"/>
+                        </a:rPr>
+                        <m:t>=</m:t>
+                      </m:r>
+                      <m:sSub>
+                        <m:sSubPr>
+                          <m:ctrlPr>
+                            <a:rPr lang="en-US" b="0" i="1" smtClean="0">
+                              <a:solidFill>
+                                <a:schemeClr val="accent6">
+                                  <a:lumMod val="75000"/>
+                                </a:schemeClr>
+                              </a:solidFill>
+                              <a:latin typeface="Cambria Math" panose="02040503050406030204" pitchFamily="18" charset="0"/>
+                            </a:rPr>
+                          </m:ctrlPr>
+                        </m:sSubPr>
+                        <m:e>
+                          <m:r>
+                            <a:rPr lang="en-US" b="0" i="1" smtClean="0">
+                              <a:solidFill>
+                                <a:schemeClr val="accent6">
+                                  <a:lumMod val="75000"/>
+                                </a:schemeClr>
+                              </a:solidFill>
+                              <a:latin typeface="Cambria Math" panose="02040503050406030204" pitchFamily="18" charset="0"/>
+                            </a:rPr>
+                            <m:t>𝛽</m:t>
+                          </m:r>
+                        </m:e>
+                        <m:sub>
+                          <m:r>
+                            <a:rPr lang="en-US" b="0" i="1" smtClean="0">
+                              <a:solidFill>
+                                <a:schemeClr val="accent6">
+                                  <a:lumMod val="75000"/>
+                                </a:schemeClr>
+                              </a:solidFill>
+                              <a:latin typeface="Cambria Math" panose="02040503050406030204" pitchFamily="18" charset="0"/>
+                            </a:rPr>
+                            <m:t>1</m:t>
+                          </m:r>
+                          <m:r>
+                            <a:rPr lang="en-US" b="0" i="1" smtClean="0">
+                              <a:solidFill>
+                                <a:schemeClr val="accent6">
+                                  <a:lumMod val="75000"/>
+                                </a:schemeClr>
+                              </a:solidFill>
+                              <a:latin typeface="Cambria Math" panose="02040503050406030204" pitchFamily="18" charset="0"/>
+                            </a:rPr>
+                            <m:t>𝑖</m:t>
+                          </m:r>
+                        </m:sub>
+                      </m:sSub>
+                    </m:oMath>
+                  </m:oMathPara>
+                </a14:m>
+                <a:endParaRPr lang="en-US" dirty="0"/>
+              </a:p>
+            </p:txBody>
+          </p:sp>
+        </mc:Choice>
+        <mc:Fallback xmlns="">
+          <p:sp>
+            <p:nvSpPr>
+              <p:cNvPr id="25" name="TextBox 24">
+                <a:extLst>
+                  <a:ext uri="{FF2B5EF4-FFF2-40B4-BE49-F238E27FC236}">
+                    <a16:creationId xmlns:a16="http://schemas.microsoft.com/office/drawing/2014/main" id="{A9B822BA-28B4-4188-6CD0-14D130C8E398}"/>
+                  </a:ext>
+                </a:extLst>
+              </p:cNvPr>
+              <p:cNvSpPr txBox="1">
+                <a:spLocks noRot="1" noChangeAspect="1" noMove="1" noResize="1" noEditPoints="1" noAdjustHandles="1" noChangeArrowheads="1" noChangeShapeType="1" noTextEdit="1"/>
+              </p:cNvSpPr>
+              <p:nvPr/>
+            </p:nvSpPr>
+            <p:spPr>
+              <a:xfrm>
+                <a:off x="8527766" y="1846708"/>
+                <a:ext cx="1683474" cy="369332"/>
+              </a:xfrm>
+              <a:prstGeom prst="rect">
+                <a:avLst/>
+              </a:prstGeom>
+              <a:blipFill>
+                <a:blip r:embed="rId10"/>
+                <a:stretch>
+                  <a:fillRect b="-13333"/>
+                </a:stretch>
+              </a:blipFill>
+            </p:spPr>
+            <p:txBody>
+              <a:bodyPr/>
+              <a:lstStyle/>
+              <a:p>
+                <a:r>
+                  <a:rPr lang="en-US">
+                    <a:noFill/>
+                  </a:rPr>
+                  <a:t> </a:t>
+                </a:r>
+              </a:p>
+            </p:txBody>
+          </p:sp>
+        </mc:Fallback>
+      </mc:AlternateContent>
+      <mc:AlternateContent xmlns:mc="http://schemas.openxmlformats.org/markup-compatibility/2006" xmlns:a14="http://schemas.microsoft.com/office/drawing/2010/main">
+        <mc:Choice Requires="a14">
+          <p:sp>
+            <p:nvSpPr>
+              <p:cNvPr id="26" name="TextBox 25">
+                <a:extLst>
+                  <a:ext uri="{FF2B5EF4-FFF2-40B4-BE49-F238E27FC236}">
+                    <a16:creationId xmlns:a16="http://schemas.microsoft.com/office/drawing/2014/main" id="{BAC2CA5E-625B-B6C2-2AFE-7482F54D3C3E}"/>
+                  </a:ext>
+                </a:extLst>
+              </p:cNvPr>
+              <p:cNvSpPr txBox="1"/>
+              <p:nvPr/>
+            </p:nvSpPr>
+            <p:spPr>
+              <a:xfrm>
+                <a:off x="9197490" y="943613"/>
+                <a:ext cx="1265475" cy="369332"/>
+              </a:xfrm>
+              <a:prstGeom prst="rect">
+                <a:avLst/>
+              </a:prstGeom>
+              <a:noFill/>
+            </p:spPr>
+            <p:txBody>
+              <a:bodyPr wrap="none" rtlCol="0">
+                <a:spAutoFit/>
+              </a:bodyPr>
+              <a:lstStyle/>
+              <a:p>
+                <a:r>
+                  <a:rPr lang="en-US" dirty="0">
+                    <a:solidFill>
+                      <a:schemeClr val="accent6">
+                        <a:lumMod val="75000"/>
+                      </a:schemeClr>
+                    </a:solidFill>
+                  </a:rPr>
+                  <a:t>group </a:t>
+                </a:r>
+                <a14:m>
+                  <m:oMath xmlns:m="http://schemas.openxmlformats.org/officeDocument/2006/math">
+                    <m:r>
+                      <a:rPr lang="en-US" b="0" i="1" smtClean="0">
+                        <a:solidFill>
+                          <a:schemeClr val="accent6">
+                            <a:lumMod val="75000"/>
+                          </a:schemeClr>
+                        </a:solidFill>
+                        <a:latin typeface="Cambria Math" panose="02040503050406030204" pitchFamily="18" charset="0"/>
+                      </a:rPr>
+                      <m:t>𝑖</m:t>
+                    </m:r>
+                  </m:oMath>
+                </a14:m>
+                <a:r>
+                  <a:rPr lang="en-US" dirty="0">
+                    <a:solidFill>
+                      <a:schemeClr val="accent6">
+                        <a:lumMod val="75000"/>
+                      </a:schemeClr>
+                    </a:solidFill>
+                  </a:rPr>
+                  <a:t> line</a:t>
+                </a:r>
+              </a:p>
+            </p:txBody>
+          </p:sp>
+        </mc:Choice>
+        <mc:Fallback xmlns="">
+          <p:sp>
+            <p:nvSpPr>
+              <p:cNvPr id="26" name="TextBox 25">
+                <a:extLst>
+                  <a:ext uri="{FF2B5EF4-FFF2-40B4-BE49-F238E27FC236}">
+                    <a16:creationId xmlns:a16="http://schemas.microsoft.com/office/drawing/2014/main" id="{BAC2CA5E-625B-B6C2-2AFE-7482F54D3C3E}"/>
+                  </a:ext>
+                </a:extLst>
+              </p:cNvPr>
+              <p:cNvSpPr txBox="1">
+                <a:spLocks noRot="1" noChangeAspect="1" noMove="1" noResize="1" noEditPoints="1" noAdjustHandles="1" noChangeArrowheads="1" noChangeShapeType="1" noTextEdit="1"/>
+              </p:cNvSpPr>
+              <p:nvPr/>
+            </p:nvSpPr>
+            <p:spPr>
+              <a:xfrm>
+                <a:off x="9197490" y="943613"/>
+                <a:ext cx="1265475" cy="369332"/>
+              </a:xfrm>
+              <a:prstGeom prst="rect">
+                <a:avLst/>
+              </a:prstGeom>
+              <a:blipFill>
+                <a:blip r:embed="rId11"/>
+                <a:stretch>
+                  <a:fillRect l="-4000" t="-6667" r="-4000" b="-26667"/>
+                </a:stretch>
+              </a:blipFill>
+            </p:spPr>
+            <p:txBody>
+              <a:bodyPr/>
+              <a:lstStyle/>
+              <a:p>
+                <a:r>
+                  <a:rPr lang="en-US">
+                    <a:noFill/>
+                  </a:rPr>
+                  <a:t> </a:t>
+                </a:r>
+              </a:p>
+            </p:txBody>
+          </p:sp>
+        </mc:Fallback>
+      </mc:AlternateContent>
+      <p:cxnSp>
+        <p:nvCxnSpPr>
+          <p:cNvPr id="27" name="Straight Connector 26">
+            <a:extLst>
+              <a:ext uri="{FF2B5EF4-FFF2-40B4-BE49-F238E27FC236}">
+                <a16:creationId xmlns:a16="http://schemas.microsoft.com/office/drawing/2014/main" id="{8EAC3898-2DBF-BAF3-172B-054CEAE592FE}"/>
+              </a:ext>
+            </a:extLst>
+          </p:cNvPr>
+          <p:cNvCxnSpPr>
+            <a:cxnSpLocks/>
+          </p:cNvCxnSpPr>
+          <p:nvPr/>
+        </p:nvCxnSpPr>
+        <p:spPr>
+          <a:xfrm>
+            <a:off x="5110882" y="2107317"/>
+            <a:ext cx="0" cy="714452"/>
+          </a:xfrm>
+          <a:prstGeom prst="line">
+            <a:avLst/>
+          </a:prstGeom>
+          <a:ln w="38100">
+            <a:solidFill>
+              <a:srgbClr val="FF0000"/>
+            </a:solidFill>
+            <a:headEnd type="arrow" w="med" len="med"/>
+            <a:tailEnd type="none" w="med" len="med"/>
+          </a:ln>
+        </p:spPr>
+        <p:style>
+          <a:lnRef idx="1">
+            <a:schemeClr val="accent1"/>
+          </a:lnRef>
+          <a:fillRef idx="0">
+            <a:schemeClr val="accent1"/>
+          </a:fillRef>
+          <a:effectRef idx="0">
+            <a:schemeClr val="accent1"/>
+          </a:effectRef>
+          <a:fontRef idx="minor">
+            <a:schemeClr val="tx1"/>
+          </a:fontRef>
+        </p:style>
+      </p:cxnSp>
+      <mc:AlternateContent xmlns:mc="http://schemas.openxmlformats.org/markup-compatibility/2006" xmlns:a14="http://schemas.microsoft.com/office/drawing/2010/main">
+        <mc:Choice Requires="a14">
+          <p:sp>
+            <p:nvSpPr>
+              <p:cNvPr id="28" name="TextBox 27">
+                <a:extLst>
+                  <a:ext uri="{FF2B5EF4-FFF2-40B4-BE49-F238E27FC236}">
+                    <a16:creationId xmlns:a16="http://schemas.microsoft.com/office/drawing/2014/main" id="{CA001DF2-5573-A9DB-EE46-1D14453AB087}"/>
+                  </a:ext>
+                </a:extLst>
+              </p:cNvPr>
+              <p:cNvSpPr txBox="1"/>
+              <p:nvPr/>
+            </p:nvSpPr>
+            <p:spPr>
+              <a:xfrm>
+                <a:off x="4592482" y="2223737"/>
+                <a:ext cx="498150" cy="391646"/>
+              </a:xfrm>
+              <a:prstGeom prst="rect">
+                <a:avLst/>
+              </a:prstGeom>
+              <a:noFill/>
+            </p:spPr>
+            <p:txBody>
+              <a:bodyPr wrap="none" rtlCol="0">
+                <a:spAutoFit/>
+              </a:bodyPr>
+              <a:lstStyle/>
+              <a:p>
+                <a:pPr/>
+                <a14:m>
+                  <m:oMathPara xmlns:m="http://schemas.openxmlformats.org/officeDocument/2006/math">
+                    <m:oMathParaPr>
+                      <m:jc m:val="centerGroup"/>
+                    </m:oMathParaPr>
+                    <m:oMath xmlns:m="http://schemas.openxmlformats.org/officeDocument/2006/math">
+                      <m:sSub>
+                        <m:sSubPr>
+                          <m:ctrlPr>
+                            <a:rPr lang="en-US" b="0" i="1" smtClean="0">
+                              <a:solidFill>
+                                <a:srgbClr val="FF0000"/>
+                              </a:solidFill>
+                              <a:latin typeface="Cambria Math" panose="02040503050406030204" pitchFamily="18" charset="0"/>
+                            </a:rPr>
+                          </m:ctrlPr>
+                        </m:sSubPr>
+                        <m:e>
+                          <m:r>
+                            <a:rPr lang="en-US" b="0" i="1" smtClean="0">
+                              <a:solidFill>
+                                <a:srgbClr val="FF0000"/>
+                              </a:solidFill>
+                              <a:latin typeface="Cambria Math" panose="02040503050406030204" pitchFamily="18" charset="0"/>
+                            </a:rPr>
+                            <m:t>𝜖</m:t>
+                          </m:r>
+                        </m:e>
+                        <m:sub>
+                          <m:r>
+                            <a:rPr lang="en-US" b="0" i="1" smtClean="0">
+                              <a:solidFill>
+                                <a:srgbClr val="FF0000"/>
+                              </a:solidFill>
+                              <a:latin typeface="Cambria Math" panose="02040503050406030204" pitchFamily="18" charset="0"/>
+                            </a:rPr>
+                            <m:t>𝑖𝑗</m:t>
+                          </m:r>
+                        </m:sub>
+                      </m:sSub>
+                    </m:oMath>
+                  </m:oMathPara>
+                </a14:m>
+                <a:endParaRPr lang="en-US" dirty="0"/>
+              </a:p>
+            </p:txBody>
+          </p:sp>
+        </mc:Choice>
+        <mc:Fallback xmlns="">
+          <p:sp>
+            <p:nvSpPr>
+              <p:cNvPr id="28" name="TextBox 27">
+                <a:extLst>
+                  <a:ext uri="{FF2B5EF4-FFF2-40B4-BE49-F238E27FC236}">
+                    <a16:creationId xmlns:a16="http://schemas.microsoft.com/office/drawing/2014/main" id="{CA001DF2-5573-A9DB-EE46-1D14453AB087}"/>
+                  </a:ext>
+                </a:extLst>
+              </p:cNvPr>
+              <p:cNvSpPr txBox="1">
+                <a:spLocks noRot="1" noChangeAspect="1" noMove="1" noResize="1" noEditPoints="1" noAdjustHandles="1" noChangeArrowheads="1" noChangeShapeType="1" noTextEdit="1"/>
+              </p:cNvSpPr>
+              <p:nvPr/>
+            </p:nvSpPr>
+            <p:spPr>
+              <a:xfrm>
+                <a:off x="4592482" y="2223737"/>
+                <a:ext cx="498150" cy="391646"/>
+              </a:xfrm>
+              <a:prstGeom prst="rect">
+                <a:avLst/>
+              </a:prstGeom>
+              <a:blipFill>
+                <a:blip r:embed="rId12"/>
+                <a:stretch>
+                  <a:fillRect b="-9677"/>
+                </a:stretch>
+              </a:blipFill>
+            </p:spPr>
+            <p:txBody>
+              <a:bodyPr/>
+              <a:lstStyle/>
+              <a:p>
+                <a:r>
+                  <a:rPr lang="en-US">
+                    <a:noFill/>
+                  </a:rPr>
+                  <a:t> </a:t>
+                </a:r>
+              </a:p>
+            </p:txBody>
+          </p:sp>
+        </mc:Fallback>
+      </mc:AlternateContent>
+      <mc:AlternateContent xmlns:mc="http://schemas.openxmlformats.org/markup-compatibility/2006" xmlns:a14="http://schemas.microsoft.com/office/drawing/2010/main">
+        <mc:Choice Requires="a14">
+          <p:sp>
+            <p:nvSpPr>
+              <p:cNvPr id="29" name="TextBox 28">
+                <a:extLst>
+                  <a:ext uri="{FF2B5EF4-FFF2-40B4-BE49-F238E27FC236}">
+                    <a16:creationId xmlns:a16="http://schemas.microsoft.com/office/drawing/2014/main" id="{4B4D5C4F-7C1C-3274-6E3B-5099F7E9B4AC}"/>
+                  </a:ext>
+                </a:extLst>
+              </p:cNvPr>
+              <p:cNvSpPr txBox="1"/>
+              <p:nvPr/>
+            </p:nvSpPr>
+            <p:spPr>
+              <a:xfrm>
+                <a:off x="939655" y="3047266"/>
+                <a:ext cx="1772601" cy="369332"/>
+              </a:xfrm>
+              <a:prstGeom prst="rect">
+                <a:avLst/>
+              </a:prstGeom>
+              <a:noFill/>
+            </p:spPr>
+            <p:txBody>
+              <a:bodyPr wrap="none" rtlCol="0">
+                <a:spAutoFit/>
+              </a:bodyPr>
+              <a:lstStyle/>
+              <a:p>
+                <a:r>
+                  <a:rPr lang="en-US" dirty="0">
+                    <a:solidFill>
+                      <a:schemeClr val="accent6">
+                        <a:lumMod val="75000"/>
+                      </a:schemeClr>
+                    </a:solidFill>
+                  </a:rPr>
+                  <a:t>group </a:t>
+                </a:r>
+                <a14:m>
+                  <m:oMath xmlns:m="http://schemas.openxmlformats.org/officeDocument/2006/math">
+                    <m:r>
+                      <a:rPr lang="en-US" b="0" i="1" smtClean="0">
+                        <a:solidFill>
+                          <a:schemeClr val="accent6">
+                            <a:lumMod val="75000"/>
+                          </a:schemeClr>
+                        </a:solidFill>
+                        <a:latin typeface="Cambria Math" panose="02040503050406030204" pitchFamily="18" charset="0"/>
+                      </a:rPr>
+                      <m:t>𝑖</m:t>
+                    </m:r>
+                  </m:oMath>
+                </a14:m>
+                <a:r>
+                  <a:rPr lang="en-US" dirty="0">
+                    <a:solidFill>
+                      <a:schemeClr val="accent6">
+                        <a:lumMod val="75000"/>
+                      </a:schemeClr>
+                    </a:solidFill>
+                  </a:rPr>
+                  <a:t> intercept</a:t>
+                </a:r>
+              </a:p>
+            </p:txBody>
+          </p:sp>
+        </mc:Choice>
+        <mc:Fallback xmlns="">
+          <p:sp>
+            <p:nvSpPr>
+              <p:cNvPr id="29" name="TextBox 28">
+                <a:extLst>
+                  <a:ext uri="{FF2B5EF4-FFF2-40B4-BE49-F238E27FC236}">
+                    <a16:creationId xmlns:a16="http://schemas.microsoft.com/office/drawing/2014/main" id="{4B4D5C4F-7C1C-3274-6E3B-5099F7E9B4AC}"/>
+                  </a:ext>
+                </a:extLst>
+              </p:cNvPr>
+              <p:cNvSpPr txBox="1">
+                <a:spLocks noRot="1" noChangeAspect="1" noMove="1" noResize="1" noEditPoints="1" noAdjustHandles="1" noChangeArrowheads="1" noChangeShapeType="1" noTextEdit="1"/>
+              </p:cNvSpPr>
+              <p:nvPr/>
+            </p:nvSpPr>
+            <p:spPr>
+              <a:xfrm>
+                <a:off x="939655" y="3047266"/>
+                <a:ext cx="1772601" cy="369332"/>
+              </a:xfrm>
+              <a:prstGeom prst="rect">
+                <a:avLst/>
+              </a:prstGeom>
+              <a:blipFill>
+                <a:blip r:embed="rId13"/>
+                <a:stretch>
+                  <a:fillRect l="-2128" t="-10345" r="-2128" b="-27586"/>
+                </a:stretch>
+              </a:blipFill>
+            </p:spPr>
+            <p:txBody>
+              <a:bodyPr/>
+              <a:lstStyle/>
+              <a:p>
+                <a:r>
+                  <a:rPr lang="en-US">
+                    <a:noFill/>
+                  </a:rPr>
+                  <a:t> </a:t>
+                </a:r>
+              </a:p>
+            </p:txBody>
+          </p:sp>
+        </mc:Fallback>
+      </mc:AlternateContent>
+      <mc:AlternateContent xmlns:mc="http://schemas.openxmlformats.org/markup-compatibility/2006" xmlns:a14="http://schemas.microsoft.com/office/drawing/2010/main">
+        <mc:Choice Requires="a14">
+          <p:sp>
+            <p:nvSpPr>
+              <p:cNvPr id="30" name="TextBox 29">
+                <a:extLst>
+                  <a:ext uri="{FF2B5EF4-FFF2-40B4-BE49-F238E27FC236}">
+                    <a16:creationId xmlns:a16="http://schemas.microsoft.com/office/drawing/2014/main" id="{61A56E9C-7898-AE82-86D9-13C997D7C795}"/>
+                  </a:ext>
+                </a:extLst>
+              </p:cNvPr>
+              <p:cNvSpPr txBox="1"/>
+              <p:nvPr/>
+            </p:nvSpPr>
+            <p:spPr>
+              <a:xfrm>
+                <a:off x="10118033" y="1831976"/>
+                <a:ext cx="1592487" cy="369332"/>
+              </a:xfrm>
+              <a:prstGeom prst="rect">
+                <a:avLst/>
+              </a:prstGeom>
+              <a:noFill/>
+            </p:spPr>
+            <p:txBody>
+              <a:bodyPr wrap="none" rtlCol="0">
+                <a:spAutoFit/>
+              </a:bodyPr>
+              <a:lstStyle/>
+              <a:p>
+                <a:r>
+                  <a:rPr lang="en-US" dirty="0">
+                    <a:solidFill>
+                      <a:schemeClr val="accent6">
+                        <a:lumMod val="75000"/>
+                      </a:schemeClr>
+                    </a:solidFill>
+                  </a:rPr>
+                  <a:t>= group </a:t>
+                </a:r>
+                <a14:m>
+                  <m:oMath xmlns:m="http://schemas.openxmlformats.org/officeDocument/2006/math">
+                    <m:r>
+                      <a:rPr lang="en-US" b="0" i="1" smtClean="0">
+                        <a:solidFill>
+                          <a:schemeClr val="accent6">
+                            <a:lumMod val="75000"/>
+                          </a:schemeClr>
+                        </a:solidFill>
+                        <a:latin typeface="Cambria Math" panose="02040503050406030204" pitchFamily="18" charset="0"/>
+                      </a:rPr>
+                      <m:t>𝑖</m:t>
+                    </m:r>
+                  </m:oMath>
+                </a14:m>
+                <a:r>
+                  <a:rPr lang="en-US" dirty="0">
+                    <a:solidFill>
+                      <a:schemeClr val="accent6">
+                        <a:lumMod val="75000"/>
+                      </a:schemeClr>
+                    </a:solidFill>
+                  </a:rPr>
+                  <a:t> slope</a:t>
+                </a:r>
+              </a:p>
+            </p:txBody>
+          </p:sp>
+        </mc:Choice>
+        <mc:Fallback xmlns="">
+          <p:sp>
+            <p:nvSpPr>
+              <p:cNvPr id="30" name="TextBox 29">
+                <a:extLst>
+                  <a:ext uri="{FF2B5EF4-FFF2-40B4-BE49-F238E27FC236}">
+                    <a16:creationId xmlns:a16="http://schemas.microsoft.com/office/drawing/2014/main" id="{61A56E9C-7898-AE82-86D9-13C997D7C795}"/>
+                  </a:ext>
+                </a:extLst>
+              </p:cNvPr>
+              <p:cNvSpPr txBox="1">
+                <a:spLocks noRot="1" noChangeAspect="1" noMove="1" noResize="1" noEditPoints="1" noAdjustHandles="1" noChangeArrowheads="1" noChangeShapeType="1" noTextEdit="1"/>
+              </p:cNvSpPr>
+              <p:nvPr/>
+            </p:nvSpPr>
+            <p:spPr>
+              <a:xfrm>
+                <a:off x="10118033" y="1831976"/>
+                <a:ext cx="1592487" cy="369332"/>
+              </a:xfrm>
+              <a:prstGeom prst="rect">
+                <a:avLst/>
+              </a:prstGeom>
+              <a:blipFill>
+                <a:blip r:embed="rId14"/>
+                <a:stretch>
+                  <a:fillRect l="-3150" t="-6667" r="-1575" b="-23333"/>
+                </a:stretch>
+              </a:blipFill>
+            </p:spPr>
+            <p:txBody>
+              <a:bodyPr/>
+              <a:lstStyle/>
+              <a:p>
+                <a:r>
+                  <a:rPr lang="en-US">
+                    <a:noFill/>
+                  </a:rPr>
+                  <a:t> </a:t>
+                </a:r>
+              </a:p>
+            </p:txBody>
+          </p:sp>
+        </mc:Fallback>
+      </mc:AlternateContent>
+      <p:sp>
+        <p:nvSpPr>
+          <p:cNvPr id="31" name="TextBox 30">
+            <a:extLst>
+              <a:ext uri="{FF2B5EF4-FFF2-40B4-BE49-F238E27FC236}">
+                <a16:creationId xmlns:a16="http://schemas.microsoft.com/office/drawing/2014/main" id="{CC7B9C68-563C-856D-821D-0796DFFC6757}"/>
+              </a:ext>
+            </a:extLst>
+          </p:cNvPr>
+          <p:cNvSpPr txBox="1"/>
+          <p:nvPr/>
+        </p:nvSpPr>
+        <p:spPr>
+          <a:xfrm>
+            <a:off x="3568085" y="2244708"/>
+            <a:ext cx="1139223" cy="369332"/>
+          </a:xfrm>
+          <a:prstGeom prst="rect">
+            <a:avLst/>
+          </a:prstGeom>
+          <a:noFill/>
+        </p:spPr>
+        <p:txBody>
+          <a:bodyPr wrap="none" rtlCol="0">
+            <a:spAutoFit/>
+          </a:bodyPr>
+          <a:lstStyle/>
+          <a:p>
+            <a:r>
+              <a:rPr lang="en-US" dirty="0">
+                <a:solidFill>
+                  <a:srgbClr val="FF0000"/>
+                </a:solidFill>
+              </a:rPr>
+              <a:t>Residual =</a:t>
+            </a:r>
+          </a:p>
+        </p:txBody>
+      </p:sp>
+      <p:sp>
+        <p:nvSpPr>
+          <p:cNvPr id="32" name="TextBox 31">
+            <a:extLst>
+              <a:ext uri="{FF2B5EF4-FFF2-40B4-BE49-F238E27FC236}">
+                <a16:creationId xmlns:a16="http://schemas.microsoft.com/office/drawing/2014/main" id="{E3DD0DB2-EF08-2D94-F913-8C1B1FBEC9DC}"/>
+              </a:ext>
+            </a:extLst>
+          </p:cNvPr>
+          <p:cNvSpPr txBox="1"/>
+          <p:nvPr/>
+        </p:nvSpPr>
+        <p:spPr>
+          <a:xfrm>
+            <a:off x="3302560" y="4749942"/>
+            <a:ext cx="1886029" cy="369332"/>
+          </a:xfrm>
+          <a:prstGeom prst="rect">
+            <a:avLst/>
+          </a:prstGeom>
+          <a:noFill/>
+        </p:spPr>
+        <p:txBody>
+          <a:bodyPr wrap="none" rtlCol="0">
+            <a:spAutoFit/>
+          </a:bodyPr>
+          <a:lstStyle/>
+          <a:p>
+            <a:r>
+              <a:rPr lang="en-US" dirty="0">
+                <a:solidFill>
+                  <a:schemeClr val="accent1"/>
+                </a:solidFill>
+              </a:rPr>
+              <a:t>= overall intercept</a:t>
+            </a:r>
+          </a:p>
+        </p:txBody>
+      </p:sp>
+      <p:sp>
+        <p:nvSpPr>
+          <p:cNvPr id="33" name="TextBox 32">
+            <a:extLst>
+              <a:ext uri="{FF2B5EF4-FFF2-40B4-BE49-F238E27FC236}">
+                <a16:creationId xmlns:a16="http://schemas.microsoft.com/office/drawing/2014/main" id="{634D4B60-3876-3E81-6517-06809E3CABBE}"/>
+              </a:ext>
+            </a:extLst>
+          </p:cNvPr>
+          <p:cNvSpPr txBox="1"/>
+          <p:nvPr/>
+        </p:nvSpPr>
+        <p:spPr>
+          <a:xfrm>
+            <a:off x="8063106" y="3681982"/>
+            <a:ext cx="1537600" cy="369332"/>
+          </a:xfrm>
+          <a:prstGeom prst="rect">
+            <a:avLst/>
+          </a:prstGeom>
+          <a:noFill/>
+        </p:spPr>
+        <p:txBody>
+          <a:bodyPr wrap="none" rtlCol="0">
+            <a:spAutoFit/>
+          </a:bodyPr>
+          <a:lstStyle/>
+          <a:p>
+            <a:r>
+              <a:rPr lang="en-US" dirty="0">
+                <a:solidFill>
+                  <a:schemeClr val="accent1"/>
+                </a:solidFill>
+              </a:rPr>
+              <a:t>= overall slope</a:t>
+            </a:r>
+          </a:p>
+        </p:txBody>
+      </p:sp>
+      <p:sp>
+        <p:nvSpPr>
+          <p:cNvPr id="34" name="Oval 33">
+            <a:extLst>
+              <a:ext uri="{FF2B5EF4-FFF2-40B4-BE49-F238E27FC236}">
+                <a16:creationId xmlns:a16="http://schemas.microsoft.com/office/drawing/2014/main" id="{D0716222-BA71-5ED1-27B2-A6CF0F7BC8B0}"/>
+              </a:ext>
+            </a:extLst>
+          </p:cNvPr>
+          <p:cNvSpPr/>
+          <p:nvPr/>
+        </p:nvSpPr>
+        <p:spPr>
+          <a:xfrm>
+            <a:off x="5058330" y="2002213"/>
+            <a:ext cx="105104" cy="105104"/>
+          </a:xfrm>
+          <a:prstGeom prst="ellipse">
+            <a:avLst/>
+          </a:prstGeom>
+          <a:solidFill>
+            <a:schemeClr val="accent6">
+              <a:lumMod val="75000"/>
+            </a:schemeClr>
+          </a:solidFill>
+          <a:ln>
+            <a:solidFill>
+              <a:schemeClr val="accent6">
+                <a:lumMod val="75000"/>
+              </a:schemeClr>
+            </a:solidFill>
+          </a:ln>
+        </p:spPr>
+        <p:style>
+          <a:lnRef idx="2">
+            <a:schemeClr val="dk1">
+              <a:shade val="50000"/>
+            </a:schemeClr>
+          </a:lnRef>
+          <a:fillRef idx="1">
+            <a:schemeClr val="dk1"/>
+          </a:fillRef>
+          <a:effectRef idx="0">
+            <a:schemeClr val="dk1"/>
+          </a:effectRef>
+          <a:fontRef idx="minor">
+            <a:schemeClr val="lt1"/>
+          </a:fontRef>
+        </p:style>
+        <p:txBody>
+          <a:bodyPr rtlCol="0" anchor="ctr"/>
+          <a:lstStyle/>
+          <a:p>
+            <a:pPr algn="ctr"/>
+            <a:endParaRPr lang="en-US"/>
+          </a:p>
+        </p:txBody>
+      </p:sp>
+      <p:sp>
+        <p:nvSpPr>
+          <p:cNvPr id="35" name="Oval 34">
+            <a:extLst>
+              <a:ext uri="{FF2B5EF4-FFF2-40B4-BE49-F238E27FC236}">
+                <a16:creationId xmlns:a16="http://schemas.microsoft.com/office/drawing/2014/main" id="{4A1B871F-8BED-E266-0F3A-FF646168F254}"/>
+              </a:ext>
+            </a:extLst>
+          </p:cNvPr>
+          <p:cNvSpPr/>
+          <p:nvPr/>
+        </p:nvSpPr>
+        <p:spPr>
+          <a:xfrm>
+            <a:off x="4841557" y="5934769"/>
+            <a:ext cx="105104" cy="105104"/>
+          </a:xfrm>
+          <a:prstGeom prst="ellipse">
+            <a:avLst/>
+          </a:prstGeom>
+          <a:solidFill>
+            <a:schemeClr val="accent2">
+              <a:lumMod val="40000"/>
+              <a:lumOff val="60000"/>
+            </a:schemeClr>
+          </a:solidFill>
+          <a:ln>
+            <a:solidFill>
+              <a:schemeClr val="accent2">
+                <a:lumMod val="40000"/>
+                <a:lumOff val="60000"/>
+              </a:schemeClr>
+            </a:solidFill>
+          </a:ln>
+        </p:spPr>
+        <p:style>
+          <a:lnRef idx="2">
+            <a:schemeClr val="dk1">
+              <a:shade val="50000"/>
+            </a:schemeClr>
+          </a:lnRef>
+          <a:fillRef idx="1">
+            <a:schemeClr val="dk1"/>
+          </a:fillRef>
+          <a:effectRef idx="0">
+            <a:schemeClr val="dk1"/>
+          </a:effectRef>
+          <a:fontRef idx="minor">
+            <a:schemeClr val="lt1"/>
+          </a:fontRef>
+        </p:style>
+        <p:txBody>
+          <a:bodyPr rtlCol="0" anchor="ctr"/>
+          <a:lstStyle/>
+          <a:p>
+            <a:pPr algn="ctr"/>
+            <a:endParaRPr lang="en-US"/>
+          </a:p>
+        </p:txBody>
+      </p:sp>
+      <p:sp>
+        <p:nvSpPr>
+          <p:cNvPr id="36" name="Oval 35">
+            <a:extLst>
+              <a:ext uri="{FF2B5EF4-FFF2-40B4-BE49-F238E27FC236}">
+                <a16:creationId xmlns:a16="http://schemas.microsoft.com/office/drawing/2014/main" id="{CCB06D14-7CA2-F185-C362-A5C88C6AA948}"/>
+              </a:ext>
+            </a:extLst>
+          </p:cNvPr>
+          <p:cNvSpPr/>
+          <p:nvPr/>
+        </p:nvSpPr>
+        <p:spPr>
+          <a:xfrm>
+            <a:off x="5741271" y="5641556"/>
+            <a:ext cx="105104" cy="105104"/>
+          </a:xfrm>
+          <a:prstGeom prst="ellipse">
+            <a:avLst/>
+          </a:prstGeom>
+          <a:solidFill>
+            <a:schemeClr val="accent2">
+              <a:lumMod val="40000"/>
+              <a:lumOff val="60000"/>
+            </a:schemeClr>
+          </a:solidFill>
+          <a:ln>
+            <a:solidFill>
+              <a:schemeClr val="accent2">
+                <a:lumMod val="40000"/>
+                <a:lumOff val="60000"/>
+              </a:schemeClr>
+            </a:solidFill>
+          </a:ln>
+        </p:spPr>
+        <p:style>
+          <a:lnRef idx="2">
+            <a:schemeClr val="dk1">
+              <a:shade val="50000"/>
+            </a:schemeClr>
+          </a:lnRef>
+          <a:fillRef idx="1">
+            <a:schemeClr val="dk1"/>
+          </a:fillRef>
+          <a:effectRef idx="0">
+            <a:schemeClr val="dk1"/>
+          </a:effectRef>
+          <a:fontRef idx="minor">
+            <a:schemeClr val="lt1"/>
+          </a:fontRef>
+        </p:style>
+        <p:txBody>
+          <a:bodyPr rtlCol="0" anchor="ctr"/>
+          <a:lstStyle/>
+          <a:p>
+            <a:pPr algn="ctr"/>
+            <a:endParaRPr lang="en-US"/>
+          </a:p>
+        </p:txBody>
+      </p:sp>
+      <p:sp>
+        <p:nvSpPr>
+          <p:cNvPr id="37" name="Oval 36">
+            <a:extLst>
+              <a:ext uri="{FF2B5EF4-FFF2-40B4-BE49-F238E27FC236}">
+                <a16:creationId xmlns:a16="http://schemas.microsoft.com/office/drawing/2014/main" id="{AA8EAC82-B1D1-1943-F298-D79FCED4B659}"/>
+              </a:ext>
+            </a:extLst>
+          </p:cNvPr>
+          <p:cNvSpPr/>
+          <p:nvPr/>
+        </p:nvSpPr>
+        <p:spPr>
+          <a:xfrm>
+            <a:off x="5293092" y="4807101"/>
+            <a:ext cx="105104" cy="105104"/>
+          </a:xfrm>
+          <a:prstGeom prst="ellipse">
+            <a:avLst/>
+          </a:prstGeom>
+          <a:solidFill>
+            <a:srgbClr val="FBC7FD"/>
+          </a:solidFill>
+          <a:ln>
+            <a:solidFill>
+              <a:srgbClr val="FBC7FD"/>
+            </a:solidFill>
+          </a:ln>
+        </p:spPr>
+        <p:style>
+          <a:lnRef idx="2">
+            <a:schemeClr val="dk1">
+              <a:shade val="50000"/>
+            </a:schemeClr>
+          </a:lnRef>
+          <a:fillRef idx="1">
+            <a:schemeClr val="dk1"/>
+          </a:fillRef>
+          <a:effectRef idx="0">
+            <a:schemeClr val="dk1"/>
+          </a:effectRef>
+          <a:fontRef idx="minor">
+            <a:schemeClr val="lt1"/>
+          </a:fontRef>
+        </p:style>
+        <p:txBody>
+          <a:bodyPr rtlCol="0" anchor="ctr"/>
+          <a:lstStyle/>
+          <a:p>
+            <a:pPr algn="ctr"/>
+            <a:endParaRPr lang="en-US"/>
+          </a:p>
+        </p:txBody>
+      </p:sp>
+      <p:sp>
+        <p:nvSpPr>
+          <p:cNvPr id="38" name="Oval 37">
+            <a:extLst>
+              <a:ext uri="{FF2B5EF4-FFF2-40B4-BE49-F238E27FC236}">
+                <a16:creationId xmlns:a16="http://schemas.microsoft.com/office/drawing/2014/main" id="{18E59C1A-33D0-12EC-1C25-780A35ED6E91}"/>
+              </a:ext>
+            </a:extLst>
+          </p:cNvPr>
+          <p:cNvSpPr/>
+          <p:nvPr/>
+        </p:nvSpPr>
+        <p:spPr>
+          <a:xfrm>
+            <a:off x="8375242" y="4728682"/>
+            <a:ext cx="105104" cy="105104"/>
+          </a:xfrm>
+          <a:prstGeom prst="ellipse">
+            <a:avLst/>
+          </a:prstGeom>
+          <a:solidFill>
+            <a:srgbClr val="FBC7FE"/>
+          </a:solidFill>
+          <a:ln>
+            <a:solidFill>
+              <a:srgbClr val="FBC7FE"/>
+            </a:solidFill>
+          </a:ln>
+        </p:spPr>
+        <p:style>
+          <a:lnRef idx="2">
+            <a:schemeClr val="dk1">
+              <a:shade val="50000"/>
+            </a:schemeClr>
+          </a:lnRef>
+          <a:fillRef idx="1">
+            <a:schemeClr val="dk1"/>
+          </a:fillRef>
+          <a:effectRef idx="0">
+            <a:schemeClr val="dk1"/>
+          </a:effectRef>
+          <a:fontRef idx="minor">
+            <a:schemeClr val="lt1"/>
+          </a:fontRef>
+        </p:style>
+        <p:txBody>
+          <a:bodyPr rtlCol="0" anchor="ctr"/>
+          <a:lstStyle/>
+          <a:p>
+            <a:pPr algn="ctr"/>
+            <a:endParaRPr lang="en-US"/>
+          </a:p>
+        </p:txBody>
+      </p:sp>
+      <p:sp>
+        <p:nvSpPr>
+          <p:cNvPr id="39" name="Oval 38">
+            <a:extLst>
+              <a:ext uri="{FF2B5EF4-FFF2-40B4-BE49-F238E27FC236}">
+                <a16:creationId xmlns:a16="http://schemas.microsoft.com/office/drawing/2014/main" id="{54985F21-EDE5-3908-AF65-DD3DF9BA98A0}"/>
+              </a:ext>
+            </a:extLst>
+          </p:cNvPr>
+          <p:cNvSpPr/>
+          <p:nvPr/>
+        </p:nvSpPr>
+        <p:spPr>
+          <a:xfrm>
+            <a:off x="6536302" y="5016926"/>
+            <a:ext cx="105104" cy="105104"/>
+          </a:xfrm>
+          <a:prstGeom prst="ellipse">
+            <a:avLst/>
+          </a:prstGeom>
+          <a:solidFill>
+            <a:srgbClr val="FBC7FD"/>
+          </a:solidFill>
+          <a:ln>
+            <a:solidFill>
+              <a:srgbClr val="FBC7FD"/>
+            </a:solidFill>
+          </a:ln>
+        </p:spPr>
+        <p:style>
+          <a:lnRef idx="2">
+            <a:schemeClr val="dk1">
+              <a:shade val="50000"/>
+            </a:schemeClr>
+          </a:lnRef>
+          <a:fillRef idx="1">
+            <a:schemeClr val="dk1"/>
+          </a:fillRef>
+          <a:effectRef idx="0">
+            <a:schemeClr val="dk1"/>
+          </a:effectRef>
+          <a:fontRef idx="minor">
+            <a:schemeClr val="lt1"/>
+          </a:fontRef>
+        </p:style>
+        <p:txBody>
+          <a:bodyPr rtlCol="0" anchor="ctr"/>
+          <a:lstStyle/>
+          <a:p>
+            <a:pPr algn="ctr"/>
+            <a:endParaRPr lang="en-US"/>
+          </a:p>
+        </p:txBody>
+      </p:sp>
+      <p:sp>
+        <p:nvSpPr>
+          <p:cNvPr id="40" name="Oval 39">
+            <a:extLst>
+              <a:ext uri="{FF2B5EF4-FFF2-40B4-BE49-F238E27FC236}">
+                <a16:creationId xmlns:a16="http://schemas.microsoft.com/office/drawing/2014/main" id="{C0C8203F-9222-A975-2CC5-1F95BB92F376}"/>
+              </a:ext>
+            </a:extLst>
+          </p:cNvPr>
+          <p:cNvSpPr/>
+          <p:nvPr/>
+        </p:nvSpPr>
+        <p:spPr>
+          <a:xfrm>
+            <a:off x="5847509" y="3795771"/>
+            <a:ext cx="105104" cy="105104"/>
+          </a:xfrm>
+          <a:prstGeom prst="ellipse">
+            <a:avLst/>
+          </a:prstGeom>
+          <a:solidFill>
+            <a:schemeClr val="bg2">
+              <a:lumMod val="75000"/>
+            </a:schemeClr>
+          </a:solidFill>
+          <a:ln>
+            <a:solidFill>
+              <a:schemeClr val="bg2">
+                <a:lumMod val="75000"/>
+              </a:schemeClr>
+            </a:solidFill>
+          </a:ln>
+        </p:spPr>
+        <p:style>
+          <a:lnRef idx="2">
+            <a:schemeClr val="dk1">
+              <a:shade val="50000"/>
+            </a:schemeClr>
+          </a:lnRef>
+          <a:fillRef idx="1">
+            <a:schemeClr val="dk1"/>
+          </a:fillRef>
+          <a:effectRef idx="0">
+            <a:schemeClr val="dk1"/>
+          </a:effectRef>
+          <a:fontRef idx="minor">
+            <a:schemeClr val="lt1"/>
+          </a:fontRef>
+        </p:style>
+        <p:txBody>
+          <a:bodyPr rtlCol="0" anchor="ctr"/>
+          <a:lstStyle/>
+          <a:p>
+            <a:pPr algn="ctr"/>
+            <a:endParaRPr lang="en-US"/>
+          </a:p>
+        </p:txBody>
+      </p:sp>
+      <p:sp>
+        <p:nvSpPr>
+          <p:cNvPr id="41" name="Oval 40">
+            <a:extLst>
+              <a:ext uri="{FF2B5EF4-FFF2-40B4-BE49-F238E27FC236}">
+                <a16:creationId xmlns:a16="http://schemas.microsoft.com/office/drawing/2014/main" id="{D9341DED-3EDB-0A67-1C50-5C4CDB345991}"/>
+              </a:ext>
+            </a:extLst>
+          </p:cNvPr>
+          <p:cNvSpPr/>
+          <p:nvPr/>
+        </p:nvSpPr>
+        <p:spPr>
+          <a:xfrm>
+            <a:off x="4516621" y="4125288"/>
+            <a:ext cx="105104" cy="105104"/>
+          </a:xfrm>
+          <a:prstGeom prst="ellipse">
+            <a:avLst/>
+          </a:prstGeom>
+          <a:solidFill>
+            <a:schemeClr val="bg2">
+              <a:lumMod val="75000"/>
+            </a:schemeClr>
+          </a:solidFill>
+          <a:ln>
+            <a:solidFill>
+              <a:schemeClr val="bg2">
+                <a:lumMod val="75000"/>
+              </a:schemeClr>
+            </a:solidFill>
+          </a:ln>
+        </p:spPr>
+        <p:style>
+          <a:lnRef idx="2">
+            <a:schemeClr val="dk1">
+              <a:shade val="50000"/>
+            </a:schemeClr>
+          </a:lnRef>
+          <a:fillRef idx="1">
+            <a:schemeClr val="dk1"/>
+          </a:fillRef>
+          <a:effectRef idx="0">
+            <a:schemeClr val="dk1"/>
+          </a:effectRef>
+          <a:fontRef idx="minor">
+            <a:schemeClr val="lt1"/>
+          </a:fontRef>
+        </p:style>
+        <p:txBody>
+          <a:bodyPr rtlCol="0" anchor="ctr"/>
+          <a:lstStyle/>
+          <a:p>
+            <a:pPr algn="ctr"/>
+            <a:endParaRPr lang="en-US"/>
+          </a:p>
+        </p:txBody>
+      </p:sp>
+      <p:sp>
+        <p:nvSpPr>
+          <p:cNvPr id="42" name="Oval 41">
+            <a:extLst>
+              <a:ext uri="{FF2B5EF4-FFF2-40B4-BE49-F238E27FC236}">
+                <a16:creationId xmlns:a16="http://schemas.microsoft.com/office/drawing/2014/main" id="{FAD32A0D-F46E-DF00-641C-657D58060F89}"/>
+              </a:ext>
+            </a:extLst>
+          </p:cNvPr>
+          <p:cNvSpPr/>
+          <p:nvPr/>
+        </p:nvSpPr>
+        <p:spPr>
+          <a:xfrm>
+            <a:off x="8163900" y="6130287"/>
+            <a:ext cx="105104" cy="105104"/>
+          </a:xfrm>
+          <a:prstGeom prst="ellipse">
+            <a:avLst/>
+          </a:prstGeom>
+          <a:solidFill>
+            <a:schemeClr val="accent2">
+              <a:lumMod val="40000"/>
+              <a:lumOff val="60000"/>
+            </a:schemeClr>
+          </a:solidFill>
+          <a:ln>
+            <a:solidFill>
+              <a:schemeClr val="accent2">
+                <a:lumMod val="40000"/>
+                <a:lumOff val="60000"/>
+              </a:schemeClr>
+            </a:solidFill>
+          </a:ln>
+        </p:spPr>
+        <p:style>
+          <a:lnRef idx="2">
+            <a:schemeClr val="dk1">
+              <a:shade val="50000"/>
+            </a:schemeClr>
+          </a:lnRef>
+          <a:fillRef idx="1">
+            <a:schemeClr val="dk1"/>
+          </a:fillRef>
+          <a:effectRef idx="0">
+            <a:schemeClr val="dk1"/>
+          </a:effectRef>
+          <a:fontRef idx="minor">
+            <a:schemeClr val="lt1"/>
+          </a:fontRef>
+        </p:style>
+        <p:txBody>
+          <a:bodyPr rtlCol="0" anchor="ctr"/>
+          <a:lstStyle/>
+          <a:p>
+            <a:pPr algn="ctr"/>
+            <a:endParaRPr lang="en-US"/>
+          </a:p>
+        </p:txBody>
+      </p:sp>
+      <p:sp>
+        <p:nvSpPr>
+          <p:cNvPr id="43" name="Oval 42">
+            <a:extLst>
+              <a:ext uri="{FF2B5EF4-FFF2-40B4-BE49-F238E27FC236}">
+                <a16:creationId xmlns:a16="http://schemas.microsoft.com/office/drawing/2014/main" id="{CFDA949B-C901-B427-1540-BFF54CC1A502}"/>
+              </a:ext>
+            </a:extLst>
+          </p:cNvPr>
+          <p:cNvSpPr/>
+          <p:nvPr/>
+        </p:nvSpPr>
+        <p:spPr>
+          <a:xfrm>
+            <a:off x="7551683" y="4900773"/>
+            <a:ext cx="105104" cy="105104"/>
+          </a:xfrm>
+          <a:prstGeom prst="ellipse">
+            <a:avLst/>
+          </a:prstGeom>
+          <a:solidFill>
+            <a:srgbClr val="FBC7FD"/>
+          </a:solidFill>
+          <a:ln>
+            <a:solidFill>
+              <a:srgbClr val="FBC7FD"/>
+            </a:solidFill>
+          </a:ln>
+        </p:spPr>
+        <p:style>
+          <a:lnRef idx="2">
+            <a:schemeClr val="dk1">
+              <a:shade val="50000"/>
+            </a:schemeClr>
+          </a:lnRef>
+          <a:fillRef idx="1">
+            <a:schemeClr val="dk1"/>
+          </a:fillRef>
+          <a:effectRef idx="0">
+            <a:schemeClr val="dk1"/>
+          </a:effectRef>
+          <a:fontRef idx="minor">
+            <a:schemeClr val="lt1"/>
+          </a:fontRef>
+        </p:style>
+        <p:txBody>
+          <a:bodyPr rtlCol="0" anchor="ctr"/>
+          <a:lstStyle/>
+          <a:p>
+            <a:pPr algn="ctr"/>
+            <a:endParaRPr lang="en-US"/>
+          </a:p>
+        </p:txBody>
+      </p:sp>
+      <p:sp>
+        <p:nvSpPr>
+          <p:cNvPr id="44" name="Oval 43">
+            <a:extLst>
+              <a:ext uri="{FF2B5EF4-FFF2-40B4-BE49-F238E27FC236}">
+                <a16:creationId xmlns:a16="http://schemas.microsoft.com/office/drawing/2014/main" id="{002123B9-E07D-C7B5-A943-0778D37ECA48}"/>
+              </a:ext>
+            </a:extLst>
+          </p:cNvPr>
+          <p:cNvSpPr/>
+          <p:nvPr/>
+        </p:nvSpPr>
+        <p:spPr>
+          <a:xfrm>
+            <a:off x="8735522" y="5452426"/>
+            <a:ext cx="105104" cy="105104"/>
+          </a:xfrm>
+          <a:prstGeom prst="ellipse">
+            <a:avLst/>
+          </a:prstGeom>
+          <a:solidFill>
+            <a:schemeClr val="accent2">
+              <a:lumMod val="40000"/>
+              <a:lumOff val="60000"/>
+            </a:schemeClr>
+          </a:solidFill>
+          <a:ln>
+            <a:solidFill>
+              <a:schemeClr val="accent2">
+                <a:lumMod val="40000"/>
+                <a:lumOff val="60000"/>
+              </a:schemeClr>
+            </a:solidFill>
+          </a:ln>
+        </p:spPr>
+        <p:style>
+          <a:lnRef idx="2">
+            <a:schemeClr val="dk1">
+              <a:shade val="50000"/>
+            </a:schemeClr>
+          </a:lnRef>
+          <a:fillRef idx="1">
+            <a:schemeClr val="dk1"/>
+          </a:fillRef>
+          <a:effectRef idx="0">
+            <a:schemeClr val="dk1"/>
+          </a:effectRef>
+          <a:fontRef idx="minor">
+            <a:schemeClr val="lt1"/>
+          </a:fontRef>
+        </p:style>
+        <p:txBody>
+          <a:bodyPr rtlCol="0" anchor="ctr"/>
+          <a:lstStyle/>
+          <a:p>
+            <a:pPr algn="ctr"/>
+            <a:endParaRPr lang="en-US"/>
+          </a:p>
+        </p:txBody>
+      </p:sp>
+      <p:sp>
+        <p:nvSpPr>
+          <p:cNvPr id="45" name="Oval 44">
+            <a:extLst>
+              <a:ext uri="{FF2B5EF4-FFF2-40B4-BE49-F238E27FC236}">
+                <a16:creationId xmlns:a16="http://schemas.microsoft.com/office/drawing/2014/main" id="{9AC621C8-44C8-DDEB-3A8C-F61C5E0C90AB}"/>
+              </a:ext>
+            </a:extLst>
+          </p:cNvPr>
+          <p:cNvSpPr/>
+          <p:nvPr/>
+        </p:nvSpPr>
+        <p:spPr>
+          <a:xfrm>
+            <a:off x="8270138" y="4284502"/>
+            <a:ext cx="105104" cy="105104"/>
+          </a:xfrm>
+          <a:prstGeom prst="ellipse">
+            <a:avLst/>
+          </a:prstGeom>
+          <a:solidFill>
+            <a:schemeClr val="bg2">
+              <a:lumMod val="75000"/>
+            </a:schemeClr>
+          </a:solidFill>
+          <a:ln>
+            <a:solidFill>
+              <a:schemeClr val="bg2">
+                <a:lumMod val="75000"/>
+              </a:schemeClr>
+            </a:solidFill>
+          </a:ln>
+        </p:spPr>
+        <p:style>
+          <a:lnRef idx="2">
+            <a:schemeClr val="dk1">
+              <a:shade val="50000"/>
+            </a:schemeClr>
+          </a:lnRef>
+          <a:fillRef idx="1">
+            <a:schemeClr val="dk1"/>
+          </a:fillRef>
+          <a:effectRef idx="0">
+            <a:schemeClr val="dk1"/>
+          </a:effectRef>
+          <a:fontRef idx="minor">
+            <a:schemeClr val="lt1"/>
+          </a:fontRef>
+        </p:style>
+        <p:txBody>
+          <a:bodyPr rtlCol="0" anchor="ctr"/>
+          <a:lstStyle/>
+          <a:p>
+            <a:pPr algn="ctr"/>
+            <a:endParaRPr lang="en-US"/>
+          </a:p>
+        </p:txBody>
+      </p:sp>
+      <p:sp>
+        <p:nvSpPr>
+          <p:cNvPr id="46" name="Oval 45">
+            <a:extLst>
+              <a:ext uri="{FF2B5EF4-FFF2-40B4-BE49-F238E27FC236}">
+                <a16:creationId xmlns:a16="http://schemas.microsoft.com/office/drawing/2014/main" id="{3B9324DE-B1D0-3271-71EC-74E1EDF619A3}"/>
+              </a:ext>
+            </a:extLst>
+          </p:cNvPr>
+          <p:cNvSpPr/>
+          <p:nvPr/>
+        </p:nvSpPr>
+        <p:spPr>
+          <a:xfrm>
+            <a:off x="7320650" y="3047266"/>
+            <a:ext cx="105104" cy="105104"/>
+          </a:xfrm>
+          <a:prstGeom prst="ellipse">
+            <a:avLst/>
+          </a:prstGeom>
+          <a:solidFill>
+            <a:schemeClr val="bg2">
+              <a:lumMod val="75000"/>
+            </a:schemeClr>
+          </a:solidFill>
+          <a:ln>
+            <a:solidFill>
+              <a:schemeClr val="bg2">
+                <a:lumMod val="75000"/>
+              </a:schemeClr>
+            </a:solidFill>
+          </a:ln>
+        </p:spPr>
+        <p:style>
+          <a:lnRef idx="2">
+            <a:schemeClr val="dk1">
+              <a:shade val="50000"/>
+            </a:schemeClr>
+          </a:lnRef>
+          <a:fillRef idx="1">
+            <a:schemeClr val="dk1"/>
+          </a:fillRef>
+          <a:effectRef idx="0">
+            <a:schemeClr val="dk1"/>
+          </a:effectRef>
+          <a:fontRef idx="minor">
+            <a:schemeClr val="lt1"/>
+          </a:fontRef>
+        </p:style>
+        <p:txBody>
+          <a:bodyPr rtlCol="0" anchor="ctr"/>
+          <a:lstStyle/>
+          <a:p>
+            <a:pPr algn="ctr"/>
+            <a:endParaRPr lang="en-US"/>
+          </a:p>
+        </p:txBody>
+      </p:sp>
+      <p:cxnSp>
+        <p:nvCxnSpPr>
+          <p:cNvPr id="47" name="Straight Connector 46">
+            <a:extLst>
+              <a:ext uri="{FF2B5EF4-FFF2-40B4-BE49-F238E27FC236}">
+                <a16:creationId xmlns:a16="http://schemas.microsoft.com/office/drawing/2014/main" id="{53BFDA4E-B96C-452D-971E-E0BED9D65271}"/>
+              </a:ext>
+            </a:extLst>
+          </p:cNvPr>
+          <p:cNvCxnSpPr>
+            <a:cxnSpLocks/>
+          </p:cNvCxnSpPr>
+          <p:nvPr/>
+        </p:nvCxnSpPr>
+        <p:spPr>
+          <a:xfrm>
+            <a:off x="2864211" y="3719375"/>
+            <a:ext cx="0" cy="1053777"/>
+          </a:xfrm>
+          <a:prstGeom prst="line">
+            <a:avLst/>
+          </a:prstGeom>
+          <a:ln w="38100">
+            <a:solidFill>
+              <a:srgbClr val="FF0000"/>
+            </a:solidFill>
+            <a:headEnd type="arrow" w="med" len="med"/>
+            <a:tailEnd type="none" w="med" len="med"/>
+          </a:ln>
+        </p:spPr>
+        <p:style>
+          <a:lnRef idx="1">
+            <a:schemeClr val="accent1"/>
+          </a:lnRef>
+          <a:fillRef idx="0">
+            <a:schemeClr val="accent1"/>
+          </a:fillRef>
+          <a:effectRef idx="0">
+            <a:schemeClr val="accent1"/>
+          </a:effectRef>
+          <a:fontRef idx="minor">
+            <a:schemeClr val="tx1"/>
+          </a:fontRef>
+        </p:style>
+      </p:cxnSp>
+    </p:spTree>
+    <p:extLst>
+      <p:ext uri="{BB962C8B-B14F-4D97-AF65-F5344CB8AC3E}">
+        <p14:creationId xmlns:p14="http://schemas.microsoft.com/office/powerpoint/2010/main" val="1023298987"/>
+      </p:ext>
+    </p:extLst>
+  </p:cSld>
+  <p:clrMapOvr>
+    <a:masterClrMapping/>
+  </p:clrMapOvr>
+</p:sld>
+</file>
+
 <file path=ppt/theme/theme1.xml><?xml version="1.0" encoding="utf-8"?>
 <a:theme xmlns:a="http://schemas.openxmlformats.org/drawingml/2006/main" name="Office Theme">
   <a:themeElements>

</xml_diff>